<commit_message>
Add Unit Test for Flask API
</commit_message>
<xml_diff>
--- a/Presentation/Presentation.pptx
+++ b/Presentation/Presentation.pptx
@@ -5,10 +5,10 @@
     <p:sldMasterId id="2147483658" r:id="rId4"/>
   </p:sldMasterIdLst>
   <p:notesMasterIdLst>
-    <p:notesMasterId r:id="rId26"/>
+    <p:notesMasterId r:id="rId27"/>
   </p:notesMasterIdLst>
   <p:handoutMasterIdLst>
-    <p:handoutMasterId r:id="rId27"/>
+    <p:handoutMasterId r:id="rId28"/>
   </p:handoutMasterIdLst>
   <p:sldIdLst>
     <p:sldId id="342" r:id="rId5"/>
@@ -25,37 +25,38 @@
     <p:sldId id="358" r:id="rId16"/>
     <p:sldId id="328" r:id="rId17"/>
     <p:sldId id="352" r:id="rId18"/>
-    <p:sldId id="347" r:id="rId19"/>
-    <p:sldId id="351" r:id="rId20"/>
-    <p:sldId id="332" r:id="rId21"/>
-    <p:sldId id="360" r:id="rId22"/>
-    <p:sldId id="335" r:id="rId23"/>
-    <p:sldId id="359" r:id="rId24"/>
-    <p:sldId id="338" r:id="rId25"/>
+    <p:sldId id="306" r:id="rId19"/>
+    <p:sldId id="347" r:id="rId20"/>
+    <p:sldId id="351" r:id="rId21"/>
+    <p:sldId id="332" r:id="rId22"/>
+    <p:sldId id="360" r:id="rId23"/>
+    <p:sldId id="335" r:id="rId24"/>
+    <p:sldId id="359" r:id="rId25"/>
+    <p:sldId id="338" r:id="rId26"/>
   </p:sldIdLst>
   <p:sldSz cx="9144000" cy="5143500" type="screen16x9"/>
   <p:notesSz cx="6858000" cy="9144000"/>
   <p:embeddedFontLst>
     <p:embeddedFont>
       <p:font typeface="Calibri" panose="020F0502020204030204" pitchFamily="34" charset="0"/>
-      <p:regular r:id="rId28"/>
-      <p:bold r:id="rId29"/>
-      <p:italic r:id="rId30"/>
-      <p:boldItalic r:id="rId31"/>
+      <p:regular r:id="rId29"/>
+      <p:bold r:id="rId30"/>
+      <p:italic r:id="rId31"/>
+      <p:boldItalic r:id="rId32"/>
     </p:embeddedFont>
     <p:embeddedFont>
       <p:font typeface="Calibri Light" panose="020F0302020204030204" pitchFamily="34" charset="0"/>
-      <p:regular r:id="rId32"/>
-      <p:italic r:id="rId33"/>
+      <p:regular r:id="rId33"/>
+      <p:italic r:id="rId34"/>
     </p:embeddedFont>
     <p:embeddedFont>
       <p:font typeface="Montserrat" panose="00000500000000000000" pitchFamily="2" charset="0"/>
-      <p:regular r:id="rId34"/>
-      <p:bold r:id="rId35"/>
+      <p:regular r:id="rId35"/>
+      <p:bold r:id="rId36"/>
     </p:embeddedFont>
   </p:embeddedFontLst>
   <p:custDataLst>
-    <p:tags r:id="rId36"/>
+    <p:tags r:id="rId37"/>
   </p:custDataLst>
   <p:defaultTextStyle>
     <a:defPPr>
@@ -4125,6 +4126,59 @@
         </a:p>
       </dgm:t>
     </dgm:pt>
+    <dgm:pt modelId="{54BB5507-D6F5-4CA0-B828-A8A631CD2C31}">
+      <dgm:prSet custT="1"/>
+      <dgm:spPr>
+        <a:noFill/>
+        <a:ln>
+          <a:solidFill>
+            <a:schemeClr val="bg1"/>
+          </a:solidFill>
+        </a:ln>
+      </dgm:spPr>
+      <dgm:t>
+        <a:bodyPr/>
+        <a:lstStyle/>
+        <a:p>
+          <a:pPr algn="ctr">
+            <a:buNone/>
+          </a:pPr>
+          <a:r>
+            <a:rPr lang="en-US" altLang="zh-CN" sz="1400" dirty="0">
+              <a:solidFill>
+                <a:schemeClr val="bg1"/>
+              </a:solidFill>
+              <a:latin typeface="Montserrat" panose="00000500000000000000" charset="0"/>
+              <a:ea typeface="Montserrat" panose="00000500000000000000" charset="0"/>
+              <a:cs typeface="Montserrat" panose="00000500000000000000" charset="0"/>
+            </a:rPr>
+            <a:t>Google Colab</a:t>
+          </a:r>
+        </a:p>
+      </dgm:t>
+    </dgm:pt>
+    <dgm:pt modelId="{E4ACB121-94B6-4A94-A67B-F6D8B1B70AAA}" type="parTrans" cxnId="{52FB9556-2D35-48C7-A591-CD42AFA2563C}">
+      <dgm:prSet/>
+      <dgm:spPr/>
+      <dgm:t>
+        <a:bodyPr/>
+        <a:lstStyle/>
+        <a:p>
+          <a:endParaRPr lang="en-US"/>
+        </a:p>
+      </dgm:t>
+    </dgm:pt>
+    <dgm:pt modelId="{BC6C5FB8-C722-4B79-AC3B-D8FC6A842CB1}" type="sibTrans" cxnId="{52FB9556-2D35-48C7-A591-CD42AFA2563C}">
+      <dgm:prSet/>
+      <dgm:spPr/>
+      <dgm:t>
+        <a:bodyPr/>
+        <a:lstStyle/>
+        <a:p>
+          <a:endParaRPr lang="en-US"/>
+        </a:p>
+      </dgm:t>
+    </dgm:pt>
     <dgm:pt modelId="{791D4787-BE64-42A6-885D-3D4E98E5BE01}" type="pres">
       <dgm:prSet presAssocID="{AAE8ABCB-5975-4E7E-BC37-1BFBF0BC6ADD}" presName="Name0" presStyleCnt="0">
         <dgm:presLayoutVars>
@@ -4339,11 +4393,13 @@
     <dgm:cxn modelId="{490AAF61-3125-4E3C-89CF-E29B8DA62E3B}" type="presOf" srcId="{9CA0A0FE-F045-4EA5-8D68-5BA71BAF1F60}" destId="{2AD38CD1-9020-4351-9481-7C8728A7823E}" srcOrd="0" destOrd="0" presId="urn:diagrams.loki3.com/BracketList"/>
     <dgm:cxn modelId="{75EA984B-1E27-46CC-8962-D0D2BFAB431D}" type="presOf" srcId="{AAE8ABCB-5975-4E7E-BC37-1BFBF0BC6ADD}" destId="{791D4787-BE64-42A6-885D-3D4E98E5BE01}" srcOrd="0" destOrd="0" presId="urn:diagrams.loki3.com/BracketList"/>
     <dgm:cxn modelId="{35CDAC4C-8E1F-487A-A3C1-68172C37FEB0}" srcId="{9CA0A0FE-F045-4EA5-8D68-5BA71BAF1F60}" destId="{314F8E93-FE35-4B32-8D4C-43FB958B85E2}" srcOrd="0" destOrd="0" parTransId="{3F93CCEE-AECC-4D05-9B72-6553259DC347}" sibTransId="{A70B3027-CB20-4440-88F0-65D8A0058FCF}"/>
+    <dgm:cxn modelId="{52FB9556-2D35-48C7-A591-CD42AFA2563C}" srcId="{FD74FB5E-6576-4FC4-B193-784D17E5121F}" destId="{54BB5507-D6F5-4CA0-B828-A8A631CD2C31}" srcOrd="2" destOrd="0" parTransId="{E4ACB121-94B6-4A94-A67B-F6D8B1B70AAA}" sibTransId="{BC6C5FB8-C722-4B79-AC3B-D8FC6A842CB1}"/>
     <dgm:cxn modelId="{7EBB697C-9B81-4D44-936A-6EFFA999FEE8}" srcId="{AAE8ABCB-5975-4E7E-BC37-1BFBF0BC6ADD}" destId="{40136C15-FB63-4C0C-B728-3F555F87866C}" srcOrd="0" destOrd="0" parTransId="{087B9341-C634-45F5-9564-F273F2AB266E}" sibTransId="{1C1F75E0-6B81-4F91-B64B-8259E52149EE}"/>
     <dgm:cxn modelId="{3128F77E-6883-4B12-AFB0-85E99AF2C016}" type="presOf" srcId="{FD74FB5E-6576-4FC4-B193-784D17E5121F}" destId="{B206D38E-0104-4C99-B80A-BC25378F5B4B}" srcOrd="0" destOrd="0" presId="urn:diagrams.loki3.com/BracketList"/>
     <dgm:cxn modelId="{7482CD82-54D4-4231-B997-1E028C7ED5E0}" type="presOf" srcId="{314F8E93-FE35-4B32-8D4C-43FB958B85E2}" destId="{AAA2DD20-DBB2-427A-9E11-EE24E50CC28F}" srcOrd="0" destOrd="0" presId="urn:diagrams.loki3.com/BracketList"/>
     <dgm:cxn modelId="{14503084-EFDA-4BB1-BD98-924ED4A76F05}" srcId="{FD9E515F-32EF-4501-8A8C-E1BBD8A5030E}" destId="{696FCB1C-801E-431E-9759-678754848A85}" srcOrd="0" destOrd="0" parTransId="{719A01A6-7795-4B2F-98B8-608FA5EFCE08}" sibTransId="{607AE606-6FA2-4299-8C5F-A705AD04A823}"/>
     <dgm:cxn modelId="{D7EFBC95-02F7-476A-87CD-2A77B6913D78}" srcId="{AAE8ABCB-5975-4E7E-BC37-1BFBF0BC6ADD}" destId="{FD9E515F-32EF-4501-8A8C-E1BBD8A5030E}" srcOrd="1" destOrd="0" parTransId="{05D5466D-72F2-4E3E-B664-AB97AE38C8B1}" sibTransId="{6E052DF7-0CE1-4273-B800-9A3E9B9968FF}"/>
+    <dgm:cxn modelId="{FCF46099-749E-48D9-8085-105999964F6C}" type="presOf" srcId="{54BB5507-D6F5-4CA0-B828-A8A631CD2C31}" destId="{FAA3CA8B-DA72-4F21-BFAB-88CCFAAA1D57}" srcOrd="0" destOrd="2" presId="urn:diagrams.loki3.com/BracketList"/>
     <dgm:cxn modelId="{57E8ABA1-AFCA-48C8-BE44-112F370BD915}" type="presOf" srcId="{FEF30B80-1783-4192-8CA8-E5F7BB67CC38}" destId="{FAA3CA8B-DA72-4F21-BFAB-88CCFAAA1D57}" srcOrd="0" destOrd="1" presId="urn:diagrams.loki3.com/BracketList"/>
     <dgm:cxn modelId="{477E21AE-E3D3-467D-8D28-88443CA42D35}" srcId="{40136C15-FB63-4C0C-B728-3F555F87866C}" destId="{803CD608-EB3B-4E9B-A75B-AC221BD5EF6C}" srcOrd="1" destOrd="0" parTransId="{F752C1DE-DB07-4A14-91F0-6395628572FF}" sibTransId="{0DA6D0A3-8371-4A5D-83FC-EF2CCEBF7953}"/>
     <dgm:cxn modelId="{F16D4EB7-E041-4CF3-8CF4-B0226CBC1221}" srcId="{FD74FB5E-6576-4FC4-B193-784D17E5121F}" destId="{FEF30B80-1783-4192-8CA8-E5F7BB67CC38}" srcOrd="1" destOrd="0" parTransId="{77F8346C-95FA-42A4-928C-86E7981EE1E8}" sibTransId="{611902E3-58C9-4B1E-94DE-735C1BE2974D}"/>
@@ -5685,6 +5741,31 @@
             <a:cs typeface="Montserrat" panose="00000500000000000000" charset="0"/>
           </a:endParaRPr>
         </a:p>
+        <a:p>
+          <a:pPr marL="114300" lvl="1" indent="-114300" algn="ctr" defTabSz="622300">
+            <a:lnSpc>
+              <a:spcPct val="90000"/>
+            </a:lnSpc>
+            <a:spcBef>
+              <a:spcPct val="0"/>
+            </a:spcBef>
+            <a:spcAft>
+              <a:spcPct val="15000"/>
+            </a:spcAft>
+            <a:buNone/>
+          </a:pPr>
+          <a:r>
+            <a:rPr lang="en-US" altLang="zh-CN" sz="1400" kern="1200" dirty="0">
+              <a:solidFill>
+                <a:schemeClr val="bg1"/>
+              </a:solidFill>
+              <a:latin typeface="Montserrat" panose="00000500000000000000" charset="0"/>
+              <a:ea typeface="Montserrat" panose="00000500000000000000" charset="0"/>
+              <a:cs typeface="Montserrat" panose="00000500000000000000" charset="0"/>
+            </a:rPr>
+            <a:t>Google Colab</a:t>
+          </a:r>
+        </a:p>
       </dsp:txBody>
       <dsp:txXfrm>
         <a:off x="3046480" y="1988591"/>
@@ -9957,7 +10038,7 @@
               <a:rPr lang="zh-CN" altLang="en-US" smtClean="0">
                 <a:cs typeface="Montserrat" panose="00000500000000000000" charset="0"/>
               </a:rPr>
-              <a:t>2023/6/2</a:t>
+              <a:t>2023/6/4</a:t>
             </a:fld>
             <a:endParaRPr lang="zh-CN" altLang="en-US">
               <a:cs typeface="Montserrat" panose="00000500000000000000" charset="0"/>
@@ -10205,7 +10286,7 @@
                 <a:ea typeface="Montserrat" panose="00000500000000000000" charset="0"/>
                 <a:cs typeface="Montserrat" panose="00000500000000000000" charset="0"/>
               </a:rPr>
-              <a:t>2023/6/2</a:t>
+              <a:t>2023/6/4</a:t>
             </a:fld>
             <a:endParaRPr kumimoji="0" lang="zh-CN" altLang="en-US" sz="1200" b="0" i="0" u="none" strike="noStrike" kern="1200" cap="none" spc="0" normalizeH="0" baseline="0" noProof="0">
               <a:ln>
@@ -11514,7 +11595,7 @@
       </p:grpSpPr>
       <p:sp>
         <p:nvSpPr>
-          <p:cNvPr id="18434" name="幻灯片图像占位符 1"/>
+          <p:cNvPr id="43010" name="幻灯片图像占位符 1"/>
           <p:cNvSpPr>
             <a:spLocks noGrp="1" noRot="1" noChangeAspect="1" noTextEdit="1"/>
           </p:cNvSpPr>
@@ -11523,10 +11604,6 @@
           </p:nvPr>
         </p:nvSpPr>
         <p:spPr>
-          <a:xfrm>
-            <a:off x="381000" y="685800"/>
-            <a:ext cx="6096000" cy="3429000"/>
-          </a:xfrm>
           <a:ln>
             <a:solidFill>
               <a:srgbClr val="000000">
@@ -11539,7 +11616,7 @@
       </p:sp>
       <p:sp>
         <p:nvSpPr>
-          <p:cNvPr id="18435" name="备注占位符 2"/>
+          <p:cNvPr id="43011" name="备注占位符 2"/>
           <p:cNvSpPr>
             <a:spLocks noGrp="1"/>
           </p:cNvSpPr>
@@ -11568,7 +11645,7 @@
       </p:sp>
       <p:sp>
         <p:nvSpPr>
-          <p:cNvPr id="18436" name="灯片编号占位符 3"/>
+          <p:cNvPr id="43012" name="灯片编号占位符 3"/>
           <p:cNvSpPr txBox="1">
             <a:spLocks noGrp="1"/>
           </p:cNvSpPr>
@@ -11607,11 +11684,6 @@
         </p:txBody>
       </p:sp>
     </p:spTree>
-    <p:extLst>
-      <p:ext uri="{BB962C8B-B14F-4D97-AF65-F5344CB8AC3E}">
-        <p14:creationId xmlns:p14="http://schemas.microsoft.com/office/powerpoint/2010/main" val="1412797291"/>
-      </p:ext>
-    </p:extLst>
   </p:cSld>
   <p:clrMapOvr>
     <a:masterClrMapping/>
@@ -11733,6 +11805,130 @@
     </p:spTree>
     <p:extLst>
       <p:ext uri="{BB962C8B-B14F-4D97-AF65-F5344CB8AC3E}">
+        <p14:creationId xmlns:p14="http://schemas.microsoft.com/office/powerpoint/2010/main" val="1412797291"/>
+      </p:ext>
+    </p:extLst>
+  </p:cSld>
+  <p:clrMapOvr>
+    <a:masterClrMapping/>
+  </p:clrMapOvr>
+</p:notes>
+</file>
+
+<file path=ppt/notesSlides/notesSlide17.xml><?xml version="1.0" encoding="utf-8"?>
+<p:notes xmlns:a="http://schemas.openxmlformats.org/drawingml/2006/main" xmlns:r="http://schemas.openxmlformats.org/officeDocument/2006/relationships" xmlns:p="http://schemas.openxmlformats.org/presentationml/2006/main">
+  <p:cSld>
+    <p:spTree>
+      <p:nvGrpSpPr>
+        <p:cNvPr id="1" name=""/>
+        <p:cNvGrpSpPr/>
+        <p:nvPr/>
+      </p:nvGrpSpPr>
+      <p:grpSpPr>
+        <a:xfrm>
+          <a:off x="0" y="0"/>
+          <a:ext cx="0" cy="0"/>
+          <a:chOff x="0" y="0"/>
+          <a:chExt cx="0" cy="0"/>
+        </a:xfrm>
+      </p:grpSpPr>
+      <p:sp>
+        <p:nvSpPr>
+          <p:cNvPr id="18434" name="幻灯片图像占位符 1"/>
+          <p:cNvSpPr>
+            <a:spLocks noGrp="1" noRot="1" noChangeAspect="1" noTextEdit="1"/>
+          </p:cNvSpPr>
+          <p:nvPr>
+            <p:ph type="sldImg"/>
+          </p:nvPr>
+        </p:nvSpPr>
+        <p:spPr>
+          <a:xfrm>
+            <a:off x="381000" y="685800"/>
+            <a:ext cx="6096000" cy="3429000"/>
+          </a:xfrm>
+          <a:ln>
+            <a:solidFill>
+              <a:srgbClr val="000000">
+                <a:alpha val="100000"/>
+              </a:srgbClr>
+            </a:solidFill>
+            <a:miter lim="800000"/>
+          </a:ln>
+        </p:spPr>
+      </p:sp>
+      <p:sp>
+        <p:nvSpPr>
+          <p:cNvPr id="18435" name="备注占位符 2"/>
+          <p:cNvSpPr>
+            <a:spLocks noGrp="1"/>
+          </p:cNvSpPr>
+          <p:nvPr>
+            <p:ph type="body" idx="1"/>
+          </p:nvPr>
+        </p:nvSpPr>
+        <p:spPr>
+          <a:noFill/>
+          <a:ln>
+            <a:noFill/>
+          </a:ln>
+        </p:spPr>
+        <p:txBody>
+          <a:bodyPr wrap="square" lIns="91440" tIns="45720" rIns="91440" bIns="45720" anchor="t" anchorCtr="0"/>
+          <a:lstStyle/>
+          <a:p>
+            <a:pPr lvl="0" eaLnBrk="1" hangingPunct="1">
+              <a:spcBef>
+                <a:spcPct val="0"/>
+              </a:spcBef>
+            </a:pPr>
+            <a:endParaRPr lang="zh-CN" altLang="en-US" dirty="0"/>
+          </a:p>
+        </p:txBody>
+      </p:sp>
+      <p:sp>
+        <p:nvSpPr>
+          <p:cNvPr id="18436" name="灯片编号占位符 3"/>
+          <p:cNvSpPr txBox="1">
+            <a:spLocks noGrp="1"/>
+          </p:cNvSpPr>
+          <p:nvPr>
+            <p:ph type="sldNum" sz="quarter"/>
+          </p:nvPr>
+        </p:nvSpPr>
+        <p:spPr>
+          <a:xfrm>
+            <a:off x="3884613" y="8685213"/>
+            <a:ext cx="2971800" cy="458787"/>
+          </a:xfrm>
+          <a:prstGeom prst="rect">
+            <a:avLst/>
+          </a:prstGeom>
+          <a:noFill/>
+          <a:ln w="9525">
+            <a:noFill/>
+          </a:ln>
+        </p:spPr>
+        <p:txBody>
+          <a:bodyPr anchor="b" anchorCtr="0"/>
+          <a:lstStyle/>
+          <a:p>
+            <a:pPr lvl="0" algn="r" defTabSz="685800" eaLnBrk="1" hangingPunct="1">
+              <a:spcBef>
+                <a:spcPct val="0"/>
+              </a:spcBef>
+            </a:pPr>
+            <a:fld id="{9A0DB2DC-4C9A-4742-B13C-FB6460FD3503}" type="slidenum">
+              <a:rPr lang="zh-CN" altLang="en-US" dirty="0"/>
+              <a:t>17</a:t>
+            </a:fld>
+            <a:endParaRPr lang="zh-CN" altLang="en-US" dirty="0"/>
+          </a:p>
+        </p:txBody>
+      </p:sp>
+    </p:spTree>
+    <p:extLst>
+      <p:ext uri="{BB962C8B-B14F-4D97-AF65-F5344CB8AC3E}">
         <p14:creationId xmlns:p14="http://schemas.microsoft.com/office/powerpoint/2010/main" val="2082434824"/>
       </p:ext>
     </p:extLst>
@@ -11743,7 +11939,7 @@
 </p:notes>
 </file>
 
-<file path=ppt/notesSlides/notesSlide17.xml><?xml version="1.0" encoding="utf-8"?>
+<file path=ppt/notesSlides/notesSlide18.xml><?xml version="1.0" encoding="utf-8"?>
 <p:notes xmlns:a="http://schemas.openxmlformats.org/drawingml/2006/main" xmlns:r="http://schemas.openxmlformats.org/officeDocument/2006/relationships" xmlns:p="http://schemas.openxmlformats.org/presentationml/2006/main">
   <p:cSld>
     <p:spTree>
@@ -11848,7 +12044,7 @@
             </a:pPr>
             <a:fld id="{9A0DB2DC-4C9A-4742-B13C-FB6460FD3503}" type="slidenum">
               <a:rPr lang="zh-CN" altLang="en-US" dirty="0"/>
-              <a:t>17</a:t>
+              <a:t>18</a:t>
             </a:fld>
             <a:endParaRPr lang="zh-CN" altLang="en-US" dirty="0"/>
           </a:p>
@@ -11862,7 +12058,7 @@
 </p:notes>
 </file>
 
-<file path=ppt/notesSlides/notesSlide18.xml><?xml version="1.0" encoding="utf-8"?>
+<file path=ppt/notesSlides/notesSlide19.xml><?xml version="1.0" encoding="utf-8"?>
 <p:notes xmlns:a="http://schemas.openxmlformats.org/drawingml/2006/main" xmlns:r="http://schemas.openxmlformats.org/officeDocument/2006/relationships" xmlns:p="http://schemas.openxmlformats.org/presentationml/2006/main">
   <p:cSld>
     <p:spTree>
@@ -11967,126 +12163,7 @@
             </a:pPr>
             <a:fld id="{9A0DB2DC-4C9A-4742-B13C-FB6460FD3503}" type="slidenum">
               <a:rPr lang="zh-CN" altLang="en-US" dirty="0"/>
-              <a:t>19</a:t>
-            </a:fld>
-            <a:endParaRPr lang="zh-CN" altLang="en-US" dirty="0"/>
-          </a:p>
-        </p:txBody>
-      </p:sp>
-    </p:spTree>
-  </p:cSld>
-  <p:clrMapOvr>
-    <a:masterClrMapping/>
-  </p:clrMapOvr>
-</p:notes>
-</file>
-
-<file path=ppt/notesSlides/notesSlide19.xml><?xml version="1.0" encoding="utf-8"?>
-<p:notes xmlns:a="http://schemas.openxmlformats.org/drawingml/2006/main" xmlns:r="http://schemas.openxmlformats.org/officeDocument/2006/relationships" xmlns:p="http://schemas.openxmlformats.org/presentationml/2006/main">
-  <p:cSld>
-    <p:spTree>
-      <p:nvGrpSpPr>
-        <p:cNvPr id="1" name=""/>
-        <p:cNvGrpSpPr/>
-        <p:nvPr/>
-      </p:nvGrpSpPr>
-      <p:grpSpPr>
-        <a:xfrm>
-          <a:off x="0" y="0"/>
-          <a:ext cx="0" cy="0"/>
-          <a:chOff x="0" y="0"/>
-          <a:chExt cx="0" cy="0"/>
-        </a:xfrm>
-      </p:grpSpPr>
-      <p:sp>
-        <p:nvSpPr>
-          <p:cNvPr id="65538" name="幻灯片图像占位符 1"/>
-          <p:cNvSpPr>
-            <a:spLocks noGrp="1" noRot="1" noChangeAspect="1" noTextEdit="1"/>
-          </p:cNvSpPr>
-          <p:nvPr>
-            <p:ph type="sldImg"/>
-          </p:nvPr>
-        </p:nvSpPr>
-        <p:spPr>
-          <a:xfrm>
-            <a:off x="381000" y="685800"/>
-            <a:ext cx="6096000" cy="3429000"/>
-          </a:xfrm>
-          <a:ln>
-            <a:solidFill>
-              <a:srgbClr val="000000">
-                <a:alpha val="100000"/>
-              </a:srgbClr>
-            </a:solidFill>
-            <a:miter lim="800000"/>
-          </a:ln>
-        </p:spPr>
-      </p:sp>
-      <p:sp>
-        <p:nvSpPr>
-          <p:cNvPr id="65539" name="备注占位符 2"/>
-          <p:cNvSpPr>
-            <a:spLocks noGrp="1"/>
-          </p:cNvSpPr>
-          <p:nvPr>
-            <p:ph type="body" idx="1"/>
-          </p:nvPr>
-        </p:nvSpPr>
-        <p:spPr>
-          <a:noFill/>
-          <a:ln>
-            <a:noFill/>
-          </a:ln>
-        </p:spPr>
-        <p:txBody>
-          <a:bodyPr wrap="square" lIns="91440" tIns="45720" rIns="91440" bIns="45720" anchor="t" anchorCtr="0"/>
-          <a:lstStyle/>
-          <a:p>
-            <a:pPr lvl="0" eaLnBrk="1" hangingPunct="1">
-              <a:spcBef>
-                <a:spcPct val="0"/>
-              </a:spcBef>
-            </a:pPr>
-            <a:endParaRPr lang="zh-CN" altLang="en-US" dirty="0"/>
-          </a:p>
-        </p:txBody>
-      </p:sp>
-      <p:sp>
-        <p:nvSpPr>
-          <p:cNvPr id="65540" name="灯片编号占位符 3"/>
-          <p:cNvSpPr txBox="1">
-            <a:spLocks noGrp="1"/>
-          </p:cNvSpPr>
-          <p:nvPr>
-            <p:ph type="sldNum" sz="quarter"/>
-          </p:nvPr>
-        </p:nvSpPr>
-        <p:spPr>
-          <a:xfrm>
-            <a:off x="3884613" y="8685213"/>
-            <a:ext cx="2971800" cy="458787"/>
-          </a:xfrm>
-          <a:prstGeom prst="rect">
-            <a:avLst/>
-          </a:prstGeom>
-          <a:noFill/>
-          <a:ln w="9525">
-            <a:noFill/>
-          </a:ln>
-        </p:spPr>
-        <p:txBody>
-          <a:bodyPr anchor="b" anchorCtr="0"/>
-          <a:lstStyle/>
-          <a:p>
-            <a:pPr lvl="0" algn="r" defTabSz="685800" eaLnBrk="1" hangingPunct="1">
-              <a:spcBef>
-                <a:spcPct val="0"/>
-              </a:spcBef>
-            </a:pPr>
-            <a:fld id="{9A0DB2DC-4C9A-4742-B13C-FB6460FD3503}" type="slidenum">
-              <a:rPr lang="zh-CN" altLang="en-US" dirty="0"/>
-              <a:t>21</a:t>
+              <a:t>20</a:t>
             </a:fld>
             <a:endParaRPr lang="zh-CN" altLang="en-US" dirty="0"/>
           </a:p>
@@ -12206,6 +12283,125 @@
             <a:fld id="{9A0DB2DC-4C9A-4742-B13C-FB6460FD3503}" type="slidenum">
               <a:rPr lang="zh-CN" altLang="en-US" dirty="0"/>
               <a:t>2</a:t>
+            </a:fld>
+            <a:endParaRPr lang="zh-CN" altLang="en-US" dirty="0"/>
+          </a:p>
+        </p:txBody>
+      </p:sp>
+    </p:spTree>
+  </p:cSld>
+  <p:clrMapOvr>
+    <a:masterClrMapping/>
+  </p:clrMapOvr>
+</p:notes>
+</file>
+
+<file path=ppt/notesSlides/notesSlide20.xml><?xml version="1.0" encoding="utf-8"?>
+<p:notes xmlns:a="http://schemas.openxmlformats.org/drawingml/2006/main" xmlns:r="http://schemas.openxmlformats.org/officeDocument/2006/relationships" xmlns:p="http://schemas.openxmlformats.org/presentationml/2006/main">
+  <p:cSld>
+    <p:spTree>
+      <p:nvGrpSpPr>
+        <p:cNvPr id="1" name=""/>
+        <p:cNvGrpSpPr/>
+        <p:nvPr/>
+      </p:nvGrpSpPr>
+      <p:grpSpPr>
+        <a:xfrm>
+          <a:off x="0" y="0"/>
+          <a:ext cx="0" cy="0"/>
+          <a:chOff x="0" y="0"/>
+          <a:chExt cx="0" cy="0"/>
+        </a:xfrm>
+      </p:grpSpPr>
+      <p:sp>
+        <p:nvSpPr>
+          <p:cNvPr id="65538" name="幻灯片图像占位符 1"/>
+          <p:cNvSpPr>
+            <a:spLocks noGrp="1" noRot="1" noChangeAspect="1" noTextEdit="1"/>
+          </p:cNvSpPr>
+          <p:nvPr>
+            <p:ph type="sldImg"/>
+          </p:nvPr>
+        </p:nvSpPr>
+        <p:spPr>
+          <a:xfrm>
+            <a:off x="381000" y="685800"/>
+            <a:ext cx="6096000" cy="3429000"/>
+          </a:xfrm>
+          <a:ln>
+            <a:solidFill>
+              <a:srgbClr val="000000">
+                <a:alpha val="100000"/>
+              </a:srgbClr>
+            </a:solidFill>
+            <a:miter lim="800000"/>
+          </a:ln>
+        </p:spPr>
+      </p:sp>
+      <p:sp>
+        <p:nvSpPr>
+          <p:cNvPr id="65539" name="备注占位符 2"/>
+          <p:cNvSpPr>
+            <a:spLocks noGrp="1"/>
+          </p:cNvSpPr>
+          <p:nvPr>
+            <p:ph type="body" idx="1"/>
+          </p:nvPr>
+        </p:nvSpPr>
+        <p:spPr>
+          <a:noFill/>
+          <a:ln>
+            <a:noFill/>
+          </a:ln>
+        </p:spPr>
+        <p:txBody>
+          <a:bodyPr wrap="square" lIns="91440" tIns="45720" rIns="91440" bIns="45720" anchor="t" anchorCtr="0"/>
+          <a:lstStyle/>
+          <a:p>
+            <a:pPr lvl="0" eaLnBrk="1" hangingPunct="1">
+              <a:spcBef>
+                <a:spcPct val="0"/>
+              </a:spcBef>
+            </a:pPr>
+            <a:endParaRPr lang="zh-CN" altLang="en-US" dirty="0"/>
+          </a:p>
+        </p:txBody>
+      </p:sp>
+      <p:sp>
+        <p:nvSpPr>
+          <p:cNvPr id="65540" name="灯片编号占位符 3"/>
+          <p:cNvSpPr txBox="1">
+            <a:spLocks noGrp="1"/>
+          </p:cNvSpPr>
+          <p:nvPr>
+            <p:ph type="sldNum" sz="quarter"/>
+          </p:nvPr>
+        </p:nvSpPr>
+        <p:spPr>
+          <a:xfrm>
+            <a:off x="3884613" y="8685213"/>
+            <a:ext cx="2971800" cy="458787"/>
+          </a:xfrm>
+          <a:prstGeom prst="rect">
+            <a:avLst/>
+          </a:prstGeom>
+          <a:noFill/>
+          <a:ln w="9525">
+            <a:noFill/>
+          </a:ln>
+        </p:spPr>
+        <p:txBody>
+          <a:bodyPr anchor="b" anchorCtr="0"/>
+          <a:lstStyle/>
+          <a:p>
+            <a:pPr lvl="0" algn="r" defTabSz="685800" eaLnBrk="1" hangingPunct="1">
+              <a:spcBef>
+                <a:spcPct val="0"/>
+              </a:spcBef>
+            </a:pPr>
+            <a:fld id="{9A0DB2DC-4C9A-4742-B13C-FB6460FD3503}" type="slidenum">
+              <a:rPr lang="zh-CN" altLang="en-US" dirty="0"/>
+              <a:t>22</a:t>
             </a:fld>
             <a:endParaRPr lang="zh-CN" altLang="en-US" dirty="0"/>
           </a:p>
@@ -13194,7 +13390,7 @@
           <a:p>
             <a:fld id="{C764DE79-268F-4C1A-8933-263129D2AF90}" type="datetimeFigureOut">
               <a:rPr lang="en-US" dirty="0"/>
-              <a:t>6/2/2023</a:t>
+              <a:t>6/4/2023</a:t>
             </a:fld>
             <a:endParaRPr lang="en-US" dirty="0"/>
           </a:p>
@@ -13365,7 +13561,7 @@
           <a:p>
             <a:fld id="{C764DE79-268F-4C1A-8933-263129D2AF90}" type="datetimeFigureOut">
               <a:rPr lang="en-US" dirty="0"/>
-              <a:t>6/2/2023</a:t>
+              <a:t>6/4/2023</a:t>
             </a:fld>
             <a:endParaRPr lang="en-US" dirty="0"/>
           </a:p>
@@ -13546,7 +13742,7 @@
           <a:p>
             <a:fld id="{C764DE79-268F-4C1A-8933-263129D2AF90}" type="datetimeFigureOut">
               <a:rPr lang="en-US" dirty="0"/>
-              <a:t>6/2/2023</a:t>
+              <a:t>6/4/2023</a:t>
             </a:fld>
             <a:endParaRPr lang="en-US" dirty="0"/>
           </a:p>
@@ -13776,7 +13972,7 @@
           <a:p>
             <a:fld id="{C764DE79-268F-4C1A-8933-263129D2AF90}" type="datetimeFigureOut">
               <a:rPr lang="en-US" dirty="0"/>
-              <a:t>6/2/2023</a:t>
+              <a:t>6/4/2023</a:t>
             </a:fld>
             <a:endParaRPr lang="en-US" dirty="0"/>
           </a:p>
@@ -14023,7 +14219,7 @@
           <a:p>
             <a:fld id="{C764DE79-268F-4C1A-8933-263129D2AF90}" type="datetimeFigureOut">
               <a:rPr lang="en-US" dirty="0"/>
-              <a:t>6/2/2023</a:t>
+              <a:t>6/4/2023</a:t>
             </a:fld>
             <a:endParaRPr lang="en-US" dirty="0"/>
           </a:p>
@@ -14256,7 +14452,7 @@
           <a:p>
             <a:fld id="{C764DE79-268F-4C1A-8933-263129D2AF90}" type="datetimeFigureOut">
               <a:rPr lang="en-US" dirty="0"/>
-              <a:t>6/2/2023</a:t>
+              <a:t>6/4/2023</a:t>
             </a:fld>
             <a:endParaRPr lang="en-US" dirty="0"/>
           </a:p>
@@ -14624,7 +14820,7 @@
           <a:p>
             <a:fld id="{C764DE79-268F-4C1A-8933-263129D2AF90}" type="datetimeFigureOut">
               <a:rPr lang="en-US" dirty="0"/>
-              <a:t>6/2/2023</a:t>
+              <a:t>6/4/2023</a:t>
             </a:fld>
             <a:endParaRPr lang="en-US" dirty="0"/>
           </a:p>
@@ -14743,7 +14939,7 @@
           <a:p>
             <a:fld id="{C764DE79-268F-4C1A-8933-263129D2AF90}" type="datetimeFigureOut">
               <a:rPr lang="en-US" dirty="0"/>
-              <a:t>6/2/2023</a:t>
+              <a:t>6/4/2023</a:t>
             </a:fld>
             <a:endParaRPr lang="en-US" dirty="0"/>
           </a:p>
@@ -14839,7 +15035,7 @@
           <a:p>
             <a:fld id="{C764DE79-268F-4C1A-8933-263129D2AF90}" type="datetimeFigureOut">
               <a:rPr lang="en-US" dirty="0"/>
-              <a:t>6/2/2023</a:t>
+              <a:t>6/4/2023</a:t>
             </a:fld>
             <a:endParaRPr lang="en-US" dirty="0"/>
           </a:p>
@@ -15117,7 +15313,7 @@
           <a:p>
             <a:fld id="{C764DE79-268F-4C1A-8933-263129D2AF90}" type="datetimeFigureOut">
               <a:rPr lang="en-US" dirty="0"/>
-              <a:t>6/2/2023</a:t>
+              <a:t>6/4/2023</a:t>
             </a:fld>
             <a:endParaRPr lang="en-US" dirty="0"/>
           </a:p>
@@ -15375,7 +15571,7 @@
           <a:p>
             <a:fld id="{C764DE79-268F-4C1A-8933-263129D2AF90}" type="datetimeFigureOut">
               <a:rPr lang="en-US" dirty="0"/>
-              <a:t>6/2/2023</a:t>
+              <a:t>6/4/2023</a:t>
             </a:fld>
             <a:endParaRPr lang="en-US" dirty="0"/>
           </a:p>
@@ -15589,7 +15785,7 @@
           <a:p>
             <a:fld id="{C764DE79-268F-4C1A-8933-263129D2AF90}" type="datetimeFigureOut">
               <a:rPr lang="en-US" dirty="0"/>
-              <a:t>6/2/2023</a:t>
+              <a:t>6/4/2023</a:t>
             </a:fld>
             <a:endParaRPr lang="en-US" dirty="0"/>
           </a:p>
@@ -17354,7 +17550,7 @@
         <p:spPr>
           <a:xfrm>
             <a:off x="544190" y="884182"/>
-            <a:ext cx="7817084" cy="3977564"/>
+            <a:ext cx="7817084" cy="3608232"/>
           </a:xfrm>
           <a:prstGeom prst="rect">
             <a:avLst/>
@@ -17430,7 +17626,7 @@
                 <a:ea typeface="Montserrat" panose="00000500000000000000" charset="0"/>
                 <a:cs typeface="Montserrat" panose="00000500000000000000" charset="0"/>
               </a:rPr>
-              <a:t>The chatbot utilizes natural language processing and machine learning to understand patient inquiries and provide accurate responses.</a:t>
+              <a:t>The chatbot is used as a service from IBM Watson Assistant.</a:t>
             </a:r>
             <a:endParaRPr lang="en-US" altLang="zh-CN" sz="1600" b="1" dirty="0">
               <a:solidFill>
@@ -19223,7 +19419,7 @@
         </p:blipFill>
         <p:spPr>
           <a:xfrm>
-            <a:off x="596230" y="893807"/>
+            <a:off x="310480" y="893807"/>
             <a:ext cx="7920329" cy="4082053"/>
           </a:xfrm>
           <a:prstGeom prst="rect">
@@ -19266,6 +19462,1732 @@
       </p:grpSpPr>
       <p:sp>
         <p:nvSpPr>
+          <p:cNvPr id="3" name="椭圆 2"/>
+          <p:cNvSpPr/>
+          <p:nvPr/>
+        </p:nvSpPr>
+        <p:spPr>
+          <a:xfrm>
+            <a:off x="4407129" y="2093749"/>
+            <a:ext cx="553740" cy="522273"/>
+          </a:xfrm>
+          <a:prstGeom prst="ellipse">
+            <a:avLst/>
+          </a:prstGeom>
+          <a:noFill/>
+          <a:ln>
+            <a:solidFill>
+              <a:schemeClr val="bg1"/>
+            </a:solidFill>
+          </a:ln>
+        </p:spPr>
+        <p:style>
+          <a:lnRef idx="2">
+            <a:schemeClr val="accent1">
+              <a:shade val="50000"/>
+            </a:schemeClr>
+          </a:lnRef>
+          <a:fillRef idx="1">
+            <a:schemeClr val="accent1"/>
+          </a:fillRef>
+          <a:effectRef idx="0">
+            <a:schemeClr val="accent1"/>
+          </a:effectRef>
+          <a:fontRef idx="minor">
+            <a:schemeClr val="lt1"/>
+          </a:fontRef>
+        </p:style>
+        <p:txBody>
+          <a:bodyPr anchor="ctr"/>
+          <a:lstStyle/>
+          <a:p>
+            <a:pPr marL="0" marR="0" lvl="0" indent="0" algn="ctr" defTabSz="685800" rtl="0" eaLnBrk="1" fontAlgn="auto" latinLnBrk="0" hangingPunct="1">
+              <a:lnSpc>
+                <a:spcPct val="100000"/>
+              </a:lnSpc>
+              <a:spcBef>
+                <a:spcPts val="0"/>
+              </a:spcBef>
+              <a:spcAft>
+                <a:spcPts val="0"/>
+              </a:spcAft>
+              <a:buClrTx/>
+              <a:buSzTx/>
+              <a:buFontTx/>
+              <a:buNone/>
+              <a:defRPr/>
+            </a:pPr>
+            <a:r>
+              <a:rPr kumimoji="0" lang="en-US" altLang="zh-CN" sz="1100" b="1" i="0" u="none" strike="noStrike" kern="1200" cap="none" spc="0" normalizeH="0" baseline="0" noProof="0" dirty="0">
+                <a:ln>
+                  <a:noFill/>
+                </a:ln>
+                <a:solidFill>
+                  <a:schemeClr val="bg1"/>
+                </a:solidFill>
+                <a:effectLst/>
+                <a:uLnTx/>
+                <a:uFillTx/>
+                <a:latin typeface="Montserrat" panose="00000500000000000000" charset="0"/>
+                <a:ea typeface="Montserrat" panose="00000500000000000000" charset="0"/>
+                <a:cs typeface="Montserrat" panose="00000500000000000000" charset="0"/>
+              </a:rPr>
+              <a:t>V</a:t>
+            </a:r>
+            <a:r>
+              <a:rPr kumimoji="0" lang="en-US" altLang="zh-CN" sz="1200" b="1" i="0" u="none" strike="noStrike" kern="1200" cap="none" spc="0" normalizeH="0" baseline="0" noProof="0" dirty="0">
+                <a:ln>
+                  <a:noFill/>
+                </a:ln>
+                <a:solidFill>
+                  <a:schemeClr val="bg1"/>
+                </a:solidFill>
+                <a:effectLst/>
+                <a:uLnTx/>
+                <a:uFillTx/>
+                <a:latin typeface="Montserrat" panose="00000500000000000000" charset="0"/>
+                <a:ea typeface="Montserrat" panose="00000500000000000000" charset="0"/>
+                <a:cs typeface="Montserrat" panose="00000500000000000000" charset="0"/>
+              </a:rPr>
+              <a:t>S</a:t>
+            </a:r>
+            <a:endParaRPr kumimoji="0" lang="zh-CN" altLang="en-US" sz="1400" b="1" i="0" u="none" strike="noStrike" kern="1200" cap="none" spc="0" normalizeH="0" baseline="0" noProof="0" dirty="0">
+              <a:ln>
+                <a:noFill/>
+              </a:ln>
+              <a:solidFill>
+                <a:schemeClr val="bg1"/>
+              </a:solidFill>
+              <a:effectLst/>
+              <a:uLnTx/>
+              <a:uFillTx/>
+              <a:latin typeface="Montserrat" panose="00000500000000000000" charset="0"/>
+              <a:ea typeface="Montserrat" panose="00000500000000000000" charset="0"/>
+              <a:cs typeface="Montserrat" panose="00000500000000000000" charset="0"/>
+            </a:endParaRPr>
+          </a:p>
+        </p:txBody>
+      </p:sp>
+      <p:grpSp>
+        <p:nvGrpSpPr>
+          <p:cNvPr id="4" name="组合 3"/>
+          <p:cNvGrpSpPr/>
+          <p:nvPr/>
+        </p:nvGrpSpPr>
+        <p:grpSpPr>
+          <a:xfrm>
+            <a:off x="2137181" y="1851175"/>
+            <a:ext cx="2442106" cy="863173"/>
+            <a:chOff x="1120327" y="1311722"/>
+            <a:chExt cx="2699790" cy="863276"/>
+          </a:xfrm>
+        </p:grpSpPr>
+        <p:sp>
+          <p:nvSpPr>
+            <p:cNvPr id="5" name="TextBox 12"/>
+            <p:cNvSpPr txBox="1"/>
+            <p:nvPr/>
+          </p:nvSpPr>
+          <p:spPr>
+            <a:xfrm>
+              <a:off x="1120327" y="1710007"/>
+              <a:ext cx="2699790" cy="464991"/>
+            </a:xfrm>
+            <a:prstGeom prst="rect">
+              <a:avLst/>
+            </a:prstGeom>
+            <a:noFill/>
+          </p:spPr>
+          <p:txBody>
+            <a:bodyPr>
+              <a:spAutoFit/>
+            </a:bodyPr>
+            <a:lstStyle/>
+            <a:p>
+              <a:pPr marR="0" algn="ctr" defTabSz="684530" eaLnBrk="1" fontAlgn="auto" hangingPunct="1">
+                <a:lnSpc>
+                  <a:spcPct val="120000"/>
+                </a:lnSpc>
+                <a:spcBef>
+                  <a:spcPts val="0"/>
+                </a:spcBef>
+                <a:spcAft>
+                  <a:spcPts val="0"/>
+                </a:spcAft>
+                <a:buClrTx/>
+                <a:buSzTx/>
+                <a:buFontTx/>
+                <a:buNone/>
+                <a:defRPr/>
+              </a:pPr>
+              <a:r>
+                <a:rPr kumimoji="0" lang="en-US" altLang="zh-CN" sz="1050" kern="1200" cap="none" spc="0" normalizeH="0" baseline="0" noProof="0" dirty="0">
+                  <a:solidFill>
+                    <a:schemeClr val="bg1"/>
+                  </a:solidFill>
+                  <a:latin typeface="Montserrat" panose="00000500000000000000" charset="0"/>
+                  <a:ea typeface="Montserrat" panose="00000500000000000000" charset="0"/>
+                  <a:cs typeface="Montserrat" panose="00000500000000000000" charset="0"/>
+                </a:rPr>
+                <a:t>Custom convolution</a:t>
+              </a:r>
+              <a:r>
+                <a:rPr lang="en-US" altLang="zh-CN" sz="1050" dirty="0">
+                  <a:solidFill>
+                    <a:schemeClr val="bg1"/>
+                  </a:solidFill>
+                  <a:latin typeface="Montserrat" panose="00000500000000000000" charset="0"/>
+                  <a:ea typeface="Montserrat" panose="00000500000000000000" charset="0"/>
+                  <a:cs typeface="Montserrat" panose="00000500000000000000" charset="0"/>
+                </a:rPr>
+                <a:t>al neural network </a:t>
+              </a:r>
+              <a:endParaRPr kumimoji="0" lang="zh-CN" altLang="en-US" sz="1000" kern="1200" cap="none" spc="0" normalizeH="0" baseline="0" noProof="0" dirty="0">
+                <a:solidFill>
+                  <a:schemeClr val="bg1"/>
+                </a:solidFill>
+                <a:latin typeface="Montserrat" panose="00000500000000000000" charset="0"/>
+                <a:ea typeface="Montserrat" panose="00000500000000000000" charset="0"/>
+                <a:cs typeface="Montserrat" panose="00000500000000000000" charset="0"/>
+                <a:sym typeface="Arial" panose="020B0604020202020204" pitchFamily="34" charset="0"/>
+              </a:endParaRPr>
+            </a:p>
+          </p:txBody>
+        </p:sp>
+        <p:sp>
+          <p:nvSpPr>
+            <p:cNvPr id="42012" name="TextBox 13"/>
+            <p:cNvSpPr txBox="1"/>
+            <p:nvPr/>
+          </p:nvSpPr>
+          <p:spPr>
+            <a:xfrm>
+              <a:off x="1389775" y="1311722"/>
+              <a:ext cx="2039842" cy="368345"/>
+            </a:xfrm>
+            <a:prstGeom prst="rect">
+              <a:avLst/>
+            </a:prstGeom>
+            <a:noFill/>
+            <a:ln w="9525">
+              <a:noFill/>
+            </a:ln>
+          </p:spPr>
+          <p:txBody>
+            <a:bodyPr>
+              <a:spAutoFit/>
+            </a:bodyPr>
+            <a:lstStyle/>
+            <a:p>
+              <a:pPr algn="ctr" eaLnBrk="1" hangingPunct="1"/>
+              <a:r>
+                <a:rPr lang="en-US" altLang="zh-CN" b="1" dirty="0">
+                  <a:solidFill>
+                    <a:schemeClr val="bg1"/>
+                  </a:solidFill>
+                  <a:latin typeface="Montserrat" panose="00000500000000000000" charset="0"/>
+                  <a:ea typeface="Montserrat" panose="00000500000000000000" charset="0"/>
+                  <a:cs typeface="Montserrat" panose="00000500000000000000" charset="0"/>
+                </a:rPr>
+                <a:t>CNN Model</a:t>
+              </a:r>
+              <a:endParaRPr lang="zh-CN" altLang="en-US" sz="1800" b="1" dirty="0">
+                <a:solidFill>
+                  <a:schemeClr val="bg1"/>
+                </a:solidFill>
+                <a:latin typeface="Montserrat" panose="00000500000000000000" charset="0"/>
+                <a:ea typeface="Montserrat" panose="00000500000000000000" charset="0"/>
+                <a:cs typeface="Montserrat" panose="00000500000000000000" charset="0"/>
+              </a:endParaRPr>
+            </a:p>
+          </p:txBody>
+        </p:sp>
+      </p:grpSp>
+      <p:grpSp>
+        <p:nvGrpSpPr>
+          <p:cNvPr id="7" name="组合 6"/>
+          <p:cNvGrpSpPr/>
+          <p:nvPr/>
+        </p:nvGrpSpPr>
+        <p:grpSpPr>
+          <a:xfrm>
+            <a:off x="4760358" y="1888955"/>
+            <a:ext cx="2564272" cy="687242"/>
+            <a:chOff x="5189411" y="1322768"/>
+            <a:chExt cx="2742329" cy="686953"/>
+          </a:xfrm>
+        </p:grpSpPr>
+        <p:sp>
+          <p:nvSpPr>
+            <p:cNvPr id="42009" name="TextBox 14"/>
+            <p:cNvSpPr txBox="1"/>
+            <p:nvPr/>
+          </p:nvSpPr>
+          <p:spPr>
+            <a:xfrm>
+              <a:off x="5540654" y="1322768"/>
+              <a:ext cx="2039842" cy="368145"/>
+            </a:xfrm>
+            <a:prstGeom prst="rect">
+              <a:avLst/>
+            </a:prstGeom>
+            <a:noFill/>
+            <a:ln w="9525">
+              <a:noFill/>
+            </a:ln>
+          </p:spPr>
+          <p:txBody>
+            <a:bodyPr>
+              <a:spAutoFit/>
+            </a:bodyPr>
+            <a:lstStyle/>
+            <a:p>
+              <a:pPr algn="ctr" eaLnBrk="1" hangingPunct="1"/>
+              <a:r>
+                <a:rPr lang="en-US" altLang="zh-CN" sz="1800" b="1" dirty="0">
+                  <a:solidFill>
+                    <a:schemeClr val="bg1"/>
+                  </a:solidFill>
+                  <a:latin typeface="Montserrat" panose="00000500000000000000" charset="0"/>
+                  <a:ea typeface="Montserrat" panose="00000500000000000000" charset="0"/>
+                  <a:cs typeface="Montserrat" panose="00000500000000000000" charset="0"/>
+                </a:rPr>
+                <a:t>VGG16 Model </a:t>
+              </a:r>
+              <a:endParaRPr lang="zh-CN" altLang="en-US" sz="1800" b="1" dirty="0">
+                <a:solidFill>
+                  <a:schemeClr val="bg1"/>
+                </a:solidFill>
+                <a:latin typeface="Montserrat" panose="00000500000000000000" charset="0"/>
+                <a:ea typeface="Montserrat" panose="00000500000000000000" charset="0"/>
+                <a:cs typeface="Montserrat" panose="00000500000000000000" charset="0"/>
+              </a:endParaRPr>
+            </a:p>
+          </p:txBody>
+        </p:sp>
+        <p:sp>
+          <p:nvSpPr>
+            <p:cNvPr id="9" name="TextBox 15"/>
+            <p:cNvSpPr txBox="1"/>
+            <p:nvPr/>
+          </p:nvSpPr>
+          <p:spPr>
+            <a:xfrm>
+              <a:off x="5189411" y="1738799"/>
+              <a:ext cx="2742329" cy="270922"/>
+            </a:xfrm>
+            <a:prstGeom prst="rect">
+              <a:avLst/>
+            </a:prstGeom>
+            <a:noFill/>
+          </p:spPr>
+          <p:txBody>
+            <a:bodyPr>
+              <a:spAutoFit/>
+            </a:bodyPr>
+            <a:lstStyle/>
+            <a:p>
+              <a:pPr marR="0" algn="ctr" defTabSz="684530" eaLnBrk="1" fontAlgn="auto" hangingPunct="1">
+                <a:lnSpc>
+                  <a:spcPct val="120000"/>
+                </a:lnSpc>
+                <a:spcBef>
+                  <a:spcPts val="0"/>
+                </a:spcBef>
+                <a:spcAft>
+                  <a:spcPts val="0"/>
+                </a:spcAft>
+                <a:buClrTx/>
+                <a:buSzTx/>
+                <a:buFontTx/>
+                <a:buNone/>
+                <a:defRPr/>
+              </a:pPr>
+              <a:r>
+                <a:rPr kumimoji="0" lang="en-US" altLang="zh-CN" sz="1050" kern="1200" cap="none" spc="0" normalizeH="0" baseline="0" noProof="0" dirty="0">
+                  <a:solidFill>
+                    <a:schemeClr val="bg1"/>
+                  </a:solidFill>
+                  <a:latin typeface="Montserrat" panose="00000500000000000000" charset="0"/>
+                  <a:ea typeface="Montserrat" panose="00000500000000000000" charset="0"/>
+                  <a:cs typeface="Montserrat" panose="00000500000000000000" charset="0"/>
+                </a:rPr>
+                <a:t>Visual </a:t>
+              </a:r>
+              <a:r>
+                <a:rPr lang="en-US" altLang="zh-CN" sz="1050" dirty="0">
+                  <a:solidFill>
+                    <a:schemeClr val="bg1"/>
+                  </a:solidFill>
+                  <a:latin typeface="Montserrat" panose="00000500000000000000" charset="0"/>
+                  <a:ea typeface="Montserrat" panose="00000500000000000000" charset="0"/>
+                  <a:cs typeface="Montserrat" panose="00000500000000000000" charset="0"/>
+                </a:rPr>
+                <a:t>Geometry</a:t>
+              </a:r>
+              <a:r>
+                <a:rPr kumimoji="0" lang="en-US" altLang="zh-CN" sz="1050" kern="1200" cap="none" spc="0" normalizeH="0" baseline="0" noProof="0" dirty="0">
+                  <a:solidFill>
+                    <a:schemeClr val="bg1"/>
+                  </a:solidFill>
+                  <a:latin typeface="Montserrat" panose="00000500000000000000" charset="0"/>
+                  <a:ea typeface="Montserrat" panose="00000500000000000000" charset="0"/>
+                  <a:cs typeface="Montserrat" panose="00000500000000000000" charset="0"/>
+                </a:rPr>
+                <a:t> Group </a:t>
+              </a:r>
+              <a:r>
+                <a:rPr lang="en-US" altLang="zh-CN" sz="1050" dirty="0">
+                  <a:solidFill>
+                    <a:schemeClr val="bg1"/>
+                  </a:solidFill>
+                  <a:latin typeface="Montserrat" panose="00000500000000000000" charset="0"/>
+                  <a:ea typeface="Montserrat" panose="00000500000000000000" charset="0"/>
+                  <a:cs typeface="Montserrat" panose="00000500000000000000" charset="0"/>
+                </a:rPr>
+                <a:t> </a:t>
+              </a:r>
+              <a:endParaRPr kumimoji="0" lang="zh-CN" altLang="en-US" sz="1000" kern="1200" cap="none" spc="0" normalizeH="0" baseline="0" noProof="0" dirty="0">
+                <a:solidFill>
+                  <a:schemeClr val="bg1"/>
+                </a:solidFill>
+                <a:latin typeface="Montserrat" panose="00000500000000000000" charset="0"/>
+                <a:ea typeface="Montserrat" panose="00000500000000000000" charset="0"/>
+                <a:cs typeface="Montserrat" panose="00000500000000000000" charset="0"/>
+                <a:sym typeface="Arial" panose="020B0604020202020204" pitchFamily="34" charset="0"/>
+              </a:endParaRPr>
+            </a:p>
+          </p:txBody>
+        </p:sp>
+      </p:grpSp>
+      <p:sp>
+        <p:nvSpPr>
+          <p:cNvPr id="2" name="矩形 55">
+            <a:extLst>
+              <a:ext uri="{FF2B5EF4-FFF2-40B4-BE49-F238E27FC236}">
+                <a16:creationId xmlns:a16="http://schemas.microsoft.com/office/drawing/2014/main" id="{4A6B5FB7-EE1C-5D42-E7B7-BB5057845F19}"/>
+              </a:ext>
+            </a:extLst>
+          </p:cNvPr>
+          <p:cNvSpPr/>
+          <p:nvPr/>
+        </p:nvSpPr>
+        <p:spPr>
+          <a:xfrm>
+            <a:off x="544190" y="430138"/>
+            <a:ext cx="2813591" cy="369332"/>
+          </a:xfrm>
+          <a:prstGeom prst="rect">
+            <a:avLst/>
+          </a:prstGeom>
+          <a:noFill/>
+          <a:ln w="9525">
+            <a:noFill/>
+          </a:ln>
+        </p:spPr>
+        <p:txBody>
+          <a:bodyPr wrap="square">
+            <a:spAutoFit/>
+          </a:bodyPr>
+          <a:lstStyle/>
+          <a:p>
+            <a:pPr eaLnBrk="1" hangingPunct="1"/>
+            <a:r>
+              <a:rPr lang="en-US" altLang="zh-CN" dirty="0">
+                <a:solidFill>
+                  <a:schemeClr val="bg1"/>
+                </a:solidFill>
+                <a:latin typeface="Montserrat" panose="00000500000000000000" charset="0"/>
+                <a:ea typeface="Montserrat" panose="00000500000000000000" charset="0"/>
+                <a:cs typeface="Montserrat" panose="00000500000000000000" charset="0"/>
+              </a:rPr>
+              <a:t> Pneumonia Detection</a:t>
+            </a:r>
+          </a:p>
+        </p:txBody>
+      </p:sp>
+      <p:cxnSp>
+        <p:nvCxnSpPr>
+          <p:cNvPr id="6" name="直接连接符 94">
+            <a:extLst>
+              <a:ext uri="{FF2B5EF4-FFF2-40B4-BE49-F238E27FC236}">
+                <a16:creationId xmlns:a16="http://schemas.microsoft.com/office/drawing/2014/main" id="{7DAC1020-EF37-5496-B191-113B98EA0EAC}"/>
+              </a:ext>
+            </a:extLst>
+          </p:cNvPr>
+          <p:cNvCxnSpPr>
+            <a:cxnSpLocks/>
+          </p:cNvCxnSpPr>
+          <p:nvPr/>
+        </p:nvCxnSpPr>
+        <p:spPr>
+          <a:xfrm>
+            <a:off x="544190" y="335802"/>
+            <a:ext cx="0" cy="558005"/>
+          </a:xfrm>
+          <a:prstGeom prst="line">
+            <a:avLst/>
+          </a:prstGeom>
+          <a:ln>
+            <a:solidFill>
+              <a:schemeClr val="bg1"/>
+            </a:solidFill>
+          </a:ln>
+        </p:spPr>
+        <p:style>
+          <a:lnRef idx="1">
+            <a:schemeClr val="accent1"/>
+          </a:lnRef>
+          <a:fillRef idx="0">
+            <a:schemeClr val="accent1"/>
+          </a:fillRef>
+          <a:effectRef idx="0">
+            <a:schemeClr val="accent1"/>
+          </a:effectRef>
+          <a:fontRef idx="minor">
+            <a:schemeClr val="tx1"/>
+          </a:fontRef>
+        </p:style>
+      </p:cxnSp>
+      <p:cxnSp>
+        <p:nvCxnSpPr>
+          <p:cNvPr id="41987" name="直接连接符 94">
+            <a:extLst>
+              <a:ext uri="{FF2B5EF4-FFF2-40B4-BE49-F238E27FC236}">
+                <a16:creationId xmlns:a16="http://schemas.microsoft.com/office/drawing/2014/main" id="{70461FF8-B563-9FBC-2D1D-AC0C4C50D2D2}"/>
+              </a:ext>
+            </a:extLst>
+          </p:cNvPr>
+          <p:cNvCxnSpPr>
+            <a:cxnSpLocks/>
+          </p:cNvCxnSpPr>
+          <p:nvPr/>
+        </p:nvCxnSpPr>
+        <p:spPr>
+          <a:xfrm flipH="1">
+            <a:off x="1062038" y="2877159"/>
+            <a:ext cx="6148387" cy="0"/>
+          </a:xfrm>
+          <a:prstGeom prst="line">
+            <a:avLst/>
+          </a:prstGeom>
+          <a:ln>
+            <a:solidFill>
+              <a:schemeClr val="bg1"/>
+            </a:solidFill>
+          </a:ln>
+        </p:spPr>
+        <p:style>
+          <a:lnRef idx="1">
+            <a:schemeClr val="accent1"/>
+          </a:lnRef>
+          <a:fillRef idx="0">
+            <a:schemeClr val="accent1"/>
+          </a:fillRef>
+          <a:effectRef idx="0">
+            <a:schemeClr val="accent1"/>
+          </a:effectRef>
+          <a:fontRef idx="minor">
+            <a:schemeClr val="tx1"/>
+          </a:fontRef>
+        </p:style>
+      </p:cxnSp>
+      <p:cxnSp>
+        <p:nvCxnSpPr>
+          <p:cNvPr id="41992" name="直接连接符 94">
+            <a:extLst>
+              <a:ext uri="{FF2B5EF4-FFF2-40B4-BE49-F238E27FC236}">
+                <a16:creationId xmlns:a16="http://schemas.microsoft.com/office/drawing/2014/main" id="{6BA294C2-73DF-5E99-1E9A-36E289DBC6C5}"/>
+              </a:ext>
+            </a:extLst>
+          </p:cNvPr>
+          <p:cNvCxnSpPr>
+            <a:cxnSpLocks/>
+          </p:cNvCxnSpPr>
+          <p:nvPr/>
+        </p:nvCxnSpPr>
+        <p:spPr>
+          <a:xfrm flipV="1">
+            <a:off x="4683999" y="2890057"/>
+            <a:ext cx="0" cy="1990725"/>
+          </a:xfrm>
+          <a:prstGeom prst="line">
+            <a:avLst/>
+          </a:prstGeom>
+          <a:ln>
+            <a:solidFill>
+              <a:schemeClr val="bg1"/>
+            </a:solidFill>
+          </a:ln>
+        </p:spPr>
+        <p:style>
+          <a:lnRef idx="1">
+            <a:schemeClr val="accent1"/>
+          </a:lnRef>
+          <a:fillRef idx="0">
+            <a:schemeClr val="accent1"/>
+          </a:fillRef>
+          <a:effectRef idx="0">
+            <a:schemeClr val="accent1"/>
+          </a:effectRef>
+          <a:fontRef idx="minor">
+            <a:schemeClr val="tx1"/>
+          </a:fontRef>
+        </p:style>
+      </p:cxnSp>
+      <p:sp>
+        <p:nvSpPr>
+          <p:cNvPr id="41994" name="矩形 55">
+            <a:extLst>
+              <a:ext uri="{FF2B5EF4-FFF2-40B4-BE49-F238E27FC236}">
+                <a16:creationId xmlns:a16="http://schemas.microsoft.com/office/drawing/2014/main" id="{17EB9B50-B106-30CA-BCA6-6701B1DFD8F4}"/>
+              </a:ext>
+            </a:extLst>
+          </p:cNvPr>
+          <p:cNvSpPr/>
+          <p:nvPr/>
+        </p:nvSpPr>
+        <p:spPr>
+          <a:xfrm>
+            <a:off x="1185214" y="3036248"/>
+            <a:ext cx="954586" cy="276999"/>
+          </a:xfrm>
+          <a:prstGeom prst="rect">
+            <a:avLst/>
+          </a:prstGeom>
+          <a:noFill/>
+          <a:ln w="9525">
+            <a:noFill/>
+          </a:ln>
+        </p:spPr>
+        <p:txBody>
+          <a:bodyPr wrap="square">
+            <a:spAutoFit/>
+          </a:bodyPr>
+          <a:lstStyle/>
+          <a:p>
+            <a:pPr eaLnBrk="1" hangingPunct="1"/>
+            <a:r>
+              <a:rPr lang="en-US" altLang="zh-CN" sz="1200" dirty="0">
+                <a:solidFill>
+                  <a:schemeClr val="bg1"/>
+                </a:solidFill>
+                <a:latin typeface="Montserrat" panose="00000500000000000000" charset="0"/>
+                <a:ea typeface="Montserrat" panose="00000500000000000000" charset="0"/>
+                <a:cs typeface="Montserrat" panose="00000500000000000000" charset="0"/>
+              </a:rPr>
+              <a:t>Accuracy</a:t>
+            </a:r>
+          </a:p>
+        </p:txBody>
+      </p:sp>
+      <p:sp>
+        <p:nvSpPr>
+          <p:cNvPr id="41995" name="矩形 55">
+            <a:extLst>
+              <a:ext uri="{FF2B5EF4-FFF2-40B4-BE49-F238E27FC236}">
+                <a16:creationId xmlns:a16="http://schemas.microsoft.com/office/drawing/2014/main" id="{41BFB8B5-EBD8-C473-D539-4FAA058413F4}"/>
+              </a:ext>
+            </a:extLst>
+          </p:cNvPr>
+          <p:cNvSpPr/>
+          <p:nvPr/>
+        </p:nvSpPr>
+        <p:spPr>
+          <a:xfrm>
+            <a:off x="2909046" y="2997943"/>
+            <a:ext cx="954586" cy="338554"/>
+          </a:xfrm>
+          <a:prstGeom prst="rect">
+            <a:avLst/>
+          </a:prstGeom>
+          <a:noFill/>
+          <a:ln w="9525">
+            <a:noFill/>
+          </a:ln>
+        </p:spPr>
+        <p:txBody>
+          <a:bodyPr wrap="square">
+            <a:spAutoFit/>
+          </a:bodyPr>
+          <a:lstStyle/>
+          <a:p>
+            <a:pPr algn="ctr" eaLnBrk="1" hangingPunct="1"/>
+            <a:r>
+              <a:rPr lang="en-US" altLang="zh-CN" sz="1600" dirty="0">
+                <a:solidFill>
+                  <a:schemeClr val="bg1"/>
+                </a:solidFill>
+                <a:latin typeface="Montserrat" panose="00000500000000000000" charset="0"/>
+                <a:ea typeface="Montserrat" panose="00000500000000000000" charset="0"/>
+                <a:cs typeface="Montserrat" panose="00000500000000000000" charset="0"/>
+              </a:rPr>
+              <a:t>88.4% </a:t>
+            </a:r>
+          </a:p>
+        </p:txBody>
+      </p:sp>
+      <p:sp>
+        <p:nvSpPr>
+          <p:cNvPr id="41996" name="矩形 55">
+            <a:extLst>
+              <a:ext uri="{FF2B5EF4-FFF2-40B4-BE49-F238E27FC236}">
+                <a16:creationId xmlns:a16="http://schemas.microsoft.com/office/drawing/2014/main" id="{840EC6D9-8D6A-642E-F741-1FE772BCC7F7}"/>
+              </a:ext>
+            </a:extLst>
+          </p:cNvPr>
+          <p:cNvSpPr/>
+          <p:nvPr/>
+        </p:nvSpPr>
+        <p:spPr>
+          <a:xfrm>
+            <a:off x="5497534" y="2998496"/>
+            <a:ext cx="954586" cy="338554"/>
+          </a:xfrm>
+          <a:prstGeom prst="rect">
+            <a:avLst/>
+          </a:prstGeom>
+          <a:noFill/>
+          <a:ln w="9525">
+            <a:noFill/>
+          </a:ln>
+        </p:spPr>
+        <p:txBody>
+          <a:bodyPr wrap="square">
+            <a:spAutoFit/>
+          </a:bodyPr>
+          <a:lstStyle/>
+          <a:p>
+            <a:pPr algn="ctr" eaLnBrk="1" hangingPunct="1"/>
+            <a:r>
+              <a:rPr lang="en-US" altLang="zh-CN" sz="1600" dirty="0">
+                <a:solidFill>
+                  <a:schemeClr val="bg1"/>
+                </a:solidFill>
+                <a:latin typeface="Montserrat" panose="00000500000000000000" charset="0"/>
+                <a:ea typeface="Montserrat" panose="00000500000000000000" charset="0"/>
+                <a:cs typeface="Montserrat" panose="00000500000000000000" charset="0"/>
+              </a:rPr>
+              <a:t>92%</a:t>
+            </a:r>
+          </a:p>
+        </p:txBody>
+      </p:sp>
+      <p:sp>
+        <p:nvSpPr>
+          <p:cNvPr id="41997" name="矩形 55">
+            <a:extLst>
+              <a:ext uri="{FF2B5EF4-FFF2-40B4-BE49-F238E27FC236}">
+                <a16:creationId xmlns:a16="http://schemas.microsoft.com/office/drawing/2014/main" id="{7C387C0C-79B5-3BEF-3274-98B22CB0428B}"/>
+              </a:ext>
+            </a:extLst>
+          </p:cNvPr>
+          <p:cNvSpPr/>
+          <p:nvPr/>
+        </p:nvSpPr>
+        <p:spPr>
+          <a:xfrm>
+            <a:off x="1115682" y="3697232"/>
+            <a:ext cx="954586" cy="276999"/>
+          </a:xfrm>
+          <a:prstGeom prst="rect">
+            <a:avLst/>
+          </a:prstGeom>
+          <a:noFill/>
+          <a:ln w="9525">
+            <a:noFill/>
+          </a:ln>
+        </p:spPr>
+        <p:txBody>
+          <a:bodyPr wrap="square">
+            <a:spAutoFit/>
+          </a:bodyPr>
+          <a:lstStyle/>
+          <a:p>
+            <a:pPr algn="ctr" eaLnBrk="1" hangingPunct="1"/>
+            <a:r>
+              <a:rPr lang="en-US" altLang="zh-CN" sz="1200" dirty="0">
+                <a:solidFill>
+                  <a:schemeClr val="bg1"/>
+                </a:solidFill>
+                <a:latin typeface="Montserrat" panose="00000500000000000000" charset="0"/>
+                <a:ea typeface="Montserrat" panose="00000500000000000000" charset="0"/>
+                <a:cs typeface="Montserrat" panose="00000500000000000000" charset="0"/>
+              </a:rPr>
+              <a:t>Precision</a:t>
+            </a:r>
+          </a:p>
+        </p:txBody>
+      </p:sp>
+      <p:cxnSp>
+        <p:nvCxnSpPr>
+          <p:cNvPr id="42000" name="直接连接符 94">
+            <a:extLst>
+              <a:ext uri="{FF2B5EF4-FFF2-40B4-BE49-F238E27FC236}">
+                <a16:creationId xmlns:a16="http://schemas.microsoft.com/office/drawing/2014/main" id="{34B9E752-DE2A-8B84-FE0F-43F81D82F140}"/>
+              </a:ext>
+            </a:extLst>
+          </p:cNvPr>
+          <p:cNvCxnSpPr>
+            <a:cxnSpLocks/>
+          </p:cNvCxnSpPr>
+          <p:nvPr/>
+        </p:nvCxnSpPr>
+        <p:spPr>
+          <a:xfrm flipH="1">
+            <a:off x="1062038" y="3467100"/>
+            <a:ext cx="6138862" cy="8631"/>
+          </a:xfrm>
+          <a:prstGeom prst="line">
+            <a:avLst/>
+          </a:prstGeom>
+          <a:ln>
+            <a:solidFill>
+              <a:schemeClr val="bg1"/>
+            </a:solidFill>
+          </a:ln>
+        </p:spPr>
+        <p:style>
+          <a:lnRef idx="1">
+            <a:schemeClr val="accent1"/>
+          </a:lnRef>
+          <a:fillRef idx="0">
+            <a:schemeClr val="accent1"/>
+          </a:fillRef>
+          <a:effectRef idx="0">
+            <a:schemeClr val="accent1"/>
+          </a:effectRef>
+          <a:fontRef idx="minor">
+            <a:schemeClr val="tx1"/>
+          </a:fontRef>
+        </p:style>
+      </p:cxnSp>
+      <p:cxnSp>
+        <p:nvCxnSpPr>
+          <p:cNvPr id="42001" name="直接连接符 94">
+            <a:extLst>
+              <a:ext uri="{FF2B5EF4-FFF2-40B4-BE49-F238E27FC236}">
+                <a16:creationId xmlns:a16="http://schemas.microsoft.com/office/drawing/2014/main" id="{B8254D70-0157-E638-83E4-8D27A71577D2}"/>
+              </a:ext>
+            </a:extLst>
+          </p:cNvPr>
+          <p:cNvCxnSpPr>
+            <a:cxnSpLocks/>
+          </p:cNvCxnSpPr>
+          <p:nvPr/>
+        </p:nvCxnSpPr>
+        <p:spPr>
+          <a:xfrm flipH="1">
+            <a:off x="1062038" y="4181807"/>
+            <a:ext cx="6141906" cy="0"/>
+          </a:xfrm>
+          <a:prstGeom prst="line">
+            <a:avLst/>
+          </a:prstGeom>
+          <a:ln>
+            <a:solidFill>
+              <a:schemeClr val="bg1"/>
+            </a:solidFill>
+          </a:ln>
+        </p:spPr>
+        <p:style>
+          <a:lnRef idx="1">
+            <a:schemeClr val="accent1"/>
+          </a:lnRef>
+          <a:fillRef idx="0">
+            <a:schemeClr val="accent1"/>
+          </a:fillRef>
+          <a:effectRef idx="0">
+            <a:schemeClr val="accent1"/>
+          </a:effectRef>
+          <a:fontRef idx="minor">
+            <a:schemeClr val="tx1"/>
+          </a:fontRef>
+        </p:style>
+      </p:cxnSp>
+      <p:cxnSp>
+        <p:nvCxnSpPr>
+          <p:cNvPr id="42002" name="直接连接符 94">
+            <a:extLst>
+              <a:ext uri="{FF2B5EF4-FFF2-40B4-BE49-F238E27FC236}">
+                <a16:creationId xmlns:a16="http://schemas.microsoft.com/office/drawing/2014/main" id="{13DCAAD7-1B94-7510-5189-61C3475C7A23}"/>
+              </a:ext>
+            </a:extLst>
+          </p:cNvPr>
+          <p:cNvCxnSpPr>
+            <a:cxnSpLocks/>
+          </p:cNvCxnSpPr>
+          <p:nvPr/>
+        </p:nvCxnSpPr>
+        <p:spPr>
+          <a:xfrm flipV="1">
+            <a:off x="1062038" y="2886075"/>
+            <a:ext cx="0" cy="1981809"/>
+          </a:xfrm>
+          <a:prstGeom prst="line">
+            <a:avLst/>
+          </a:prstGeom>
+          <a:ln>
+            <a:solidFill>
+              <a:schemeClr val="bg1"/>
+            </a:solidFill>
+          </a:ln>
+        </p:spPr>
+        <p:style>
+          <a:lnRef idx="1">
+            <a:schemeClr val="accent1"/>
+          </a:lnRef>
+          <a:fillRef idx="0">
+            <a:schemeClr val="accent1"/>
+          </a:fillRef>
+          <a:effectRef idx="0">
+            <a:schemeClr val="accent1"/>
+          </a:effectRef>
+          <a:fontRef idx="minor">
+            <a:schemeClr val="tx1"/>
+          </a:fontRef>
+        </p:style>
+      </p:cxnSp>
+      <p:cxnSp>
+        <p:nvCxnSpPr>
+          <p:cNvPr id="42022" name="直接连接符 94">
+            <a:extLst>
+              <a:ext uri="{FF2B5EF4-FFF2-40B4-BE49-F238E27FC236}">
+                <a16:creationId xmlns:a16="http://schemas.microsoft.com/office/drawing/2014/main" id="{2736F150-5472-3AD5-ACD9-6DE8EE723527}"/>
+              </a:ext>
+            </a:extLst>
+          </p:cNvPr>
+          <p:cNvCxnSpPr>
+            <a:cxnSpLocks/>
+          </p:cNvCxnSpPr>
+          <p:nvPr/>
+        </p:nvCxnSpPr>
+        <p:spPr>
+          <a:xfrm flipV="1">
+            <a:off x="2139800" y="2877159"/>
+            <a:ext cx="0" cy="1990725"/>
+          </a:xfrm>
+          <a:prstGeom prst="line">
+            <a:avLst/>
+          </a:prstGeom>
+          <a:ln>
+            <a:solidFill>
+              <a:schemeClr val="bg1"/>
+            </a:solidFill>
+          </a:ln>
+        </p:spPr>
+        <p:style>
+          <a:lnRef idx="1">
+            <a:schemeClr val="accent1"/>
+          </a:lnRef>
+          <a:fillRef idx="0">
+            <a:schemeClr val="accent1"/>
+          </a:fillRef>
+          <a:effectRef idx="0">
+            <a:schemeClr val="accent1"/>
+          </a:effectRef>
+          <a:fontRef idx="minor">
+            <a:schemeClr val="tx1"/>
+          </a:fontRef>
+        </p:style>
+      </p:cxnSp>
+      <p:cxnSp>
+        <p:nvCxnSpPr>
+          <p:cNvPr id="42023" name="直接连接符 94">
+            <a:extLst>
+              <a:ext uri="{FF2B5EF4-FFF2-40B4-BE49-F238E27FC236}">
+                <a16:creationId xmlns:a16="http://schemas.microsoft.com/office/drawing/2014/main" id="{7EF2C061-EA07-8766-7E5A-C67A40604C3E}"/>
+              </a:ext>
+            </a:extLst>
+          </p:cNvPr>
+          <p:cNvCxnSpPr>
+            <a:cxnSpLocks/>
+          </p:cNvCxnSpPr>
+          <p:nvPr/>
+        </p:nvCxnSpPr>
+        <p:spPr>
+          <a:xfrm flipV="1">
+            <a:off x="7203944" y="2886075"/>
+            <a:ext cx="0" cy="1990725"/>
+          </a:xfrm>
+          <a:prstGeom prst="line">
+            <a:avLst/>
+          </a:prstGeom>
+          <a:ln>
+            <a:solidFill>
+              <a:schemeClr val="bg1"/>
+            </a:solidFill>
+          </a:ln>
+        </p:spPr>
+        <p:style>
+          <a:lnRef idx="1">
+            <a:schemeClr val="accent1"/>
+          </a:lnRef>
+          <a:fillRef idx="0">
+            <a:schemeClr val="accent1"/>
+          </a:fillRef>
+          <a:effectRef idx="0">
+            <a:schemeClr val="accent1"/>
+          </a:effectRef>
+          <a:fontRef idx="minor">
+            <a:schemeClr val="tx1"/>
+          </a:fontRef>
+        </p:style>
+      </p:cxnSp>
+      <p:sp>
+        <p:nvSpPr>
+          <p:cNvPr id="42028" name="矩形 55">
+            <a:extLst>
+              <a:ext uri="{FF2B5EF4-FFF2-40B4-BE49-F238E27FC236}">
+                <a16:creationId xmlns:a16="http://schemas.microsoft.com/office/drawing/2014/main" id="{51633D53-AEFE-D04A-3CE0-CF005C623C50}"/>
+              </a:ext>
+            </a:extLst>
+          </p:cNvPr>
+          <p:cNvSpPr/>
+          <p:nvPr/>
+        </p:nvSpPr>
+        <p:spPr>
+          <a:xfrm>
+            <a:off x="2836748" y="3685834"/>
+            <a:ext cx="1106600" cy="338554"/>
+          </a:xfrm>
+          <a:prstGeom prst="rect">
+            <a:avLst/>
+          </a:prstGeom>
+          <a:noFill/>
+          <a:ln w="9525">
+            <a:noFill/>
+          </a:ln>
+        </p:spPr>
+        <p:txBody>
+          <a:bodyPr wrap="square">
+            <a:spAutoFit/>
+          </a:bodyPr>
+          <a:lstStyle/>
+          <a:p>
+            <a:pPr algn="ctr" eaLnBrk="1" hangingPunct="1"/>
+            <a:r>
+              <a:rPr lang="en-US" altLang="zh-CN" sz="1600" dirty="0">
+                <a:solidFill>
+                  <a:schemeClr val="bg1"/>
+                </a:solidFill>
+                <a:latin typeface="Montserrat" panose="00000500000000000000" charset="0"/>
+                <a:ea typeface="Montserrat" panose="00000500000000000000" charset="0"/>
+                <a:cs typeface="Montserrat" panose="00000500000000000000" charset="0"/>
+              </a:rPr>
+              <a:t>87.5%</a:t>
+            </a:r>
+          </a:p>
+        </p:txBody>
+      </p:sp>
+      <p:sp>
+        <p:nvSpPr>
+          <p:cNvPr id="42029" name="矩形 55">
+            <a:extLst>
+              <a:ext uri="{FF2B5EF4-FFF2-40B4-BE49-F238E27FC236}">
+                <a16:creationId xmlns:a16="http://schemas.microsoft.com/office/drawing/2014/main" id="{6D9C24AC-8E31-63F8-A5EF-0571CD54F6F5}"/>
+              </a:ext>
+            </a:extLst>
+          </p:cNvPr>
+          <p:cNvSpPr/>
+          <p:nvPr/>
+        </p:nvSpPr>
+        <p:spPr>
+          <a:xfrm>
+            <a:off x="5346179" y="3685834"/>
+            <a:ext cx="1257297" cy="338554"/>
+          </a:xfrm>
+          <a:prstGeom prst="rect">
+            <a:avLst/>
+          </a:prstGeom>
+          <a:noFill/>
+          <a:ln w="9525">
+            <a:noFill/>
+          </a:ln>
+        </p:spPr>
+        <p:txBody>
+          <a:bodyPr wrap="square">
+            <a:spAutoFit/>
+          </a:bodyPr>
+          <a:lstStyle/>
+          <a:p>
+            <a:pPr algn="ctr" eaLnBrk="1" hangingPunct="1"/>
+            <a:r>
+              <a:rPr lang="en-US" altLang="zh-CN" sz="1600" dirty="0">
+                <a:solidFill>
+                  <a:schemeClr val="bg1"/>
+                </a:solidFill>
+                <a:latin typeface="Montserrat" panose="00000500000000000000" charset="0"/>
+                <a:ea typeface="Montserrat" panose="00000500000000000000" charset="0"/>
+                <a:cs typeface="Montserrat" panose="00000500000000000000" charset="0"/>
+              </a:rPr>
+              <a:t>91%</a:t>
+            </a:r>
+          </a:p>
+        </p:txBody>
+      </p:sp>
+      <p:sp>
+        <p:nvSpPr>
+          <p:cNvPr id="42034" name="矩形 55">
+            <a:extLst>
+              <a:ext uri="{FF2B5EF4-FFF2-40B4-BE49-F238E27FC236}">
+                <a16:creationId xmlns:a16="http://schemas.microsoft.com/office/drawing/2014/main" id="{45E795A1-562C-B679-8C11-854CEC5CB011}"/>
+              </a:ext>
+            </a:extLst>
+          </p:cNvPr>
+          <p:cNvSpPr/>
+          <p:nvPr/>
+        </p:nvSpPr>
+        <p:spPr>
+          <a:xfrm>
+            <a:off x="1115682" y="4380353"/>
+            <a:ext cx="954586" cy="276999"/>
+          </a:xfrm>
+          <a:prstGeom prst="rect">
+            <a:avLst/>
+          </a:prstGeom>
+          <a:noFill/>
+          <a:ln w="9525">
+            <a:noFill/>
+          </a:ln>
+        </p:spPr>
+        <p:txBody>
+          <a:bodyPr wrap="square">
+            <a:spAutoFit/>
+          </a:bodyPr>
+          <a:lstStyle/>
+          <a:p>
+            <a:pPr algn="ctr" eaLnBrk="1" hangingPunct="1"/>
+            <a:r>
+              <a:rPr lang="en-US" altLang="zh-CN" sz="1200" dirty="0">
+                <a:solidFill>
+                  <a:schemeClr val="bg1"/>
+                </a:solidFill>
+                <a:latin typeface="Montserrat" panose="00000500000000000000" charset="0"/>
+                <a:ea typeface="Montserrat" panose="00000500000000000000" charset="0"/>
+                <a:cs typeface="Montserrat" panose="00000500000000000000" charset="0"/>
+              </a:rPr>
+              <a:t>Recall</a:t>
+            </a:r>
+          </a:p>
+        </p:txBody>
+      </p:sp>
+      <p:cxnSp>
+        <p:nvCxnSpPr>
+          <p:cNvPr id="42035" name="直接连接符 94">
+            <a:extLst>
+              <a:ext uri="{FF2B5EF4-FFF2-40B4-BE49-F238E27FC236}">
+                <a16:creationId xmlns:a16="http://schemas.microsoft.com/office/drawing/2014/main" id="{F35D50EC-A7EB-A678-112C-00F8261A3612}"/>
+              </a:ext>
+            </a:extLst>
+          </p:cNvPr>
+          <p:cNvCxnSpPr>
+            <a:cxnSpLocks/>
+          </p:cNvCxnSpPr>
+          <p:nvPr/>
+        </p:nvCxnSpPr>
+        <p:spPr>
+          <a:xfrm flipH="1">
+            <a:off x="1068519" y="4871400"/>
+            <a:ext cx="6141906" cy="0"/>
+          </a:xfrm>
+          <a:prstGeom prst="line">
+            <a:avLst/>
+          </a:prstGeom>
+          <a:ln>
+            <a:solidFill>
+              <a:schemeClr val="bg1"/>
+            </a:solidFill>
+          </a:ln>
+        </p:spPr>
+        <p:style>
+          <a:lnRef idx="1">
+            <a:schemeClr val="accent1"/>
+          </a:lnRef>
+          <a:fillRef idx="0">
+            <a:schemeClr val="accent1"/>
+          </a:fillRef>
+          <a:effectRef idx="0">
+            <a:schemeClr val="accent1"/>
+          </a:effectRef>
+          <a:fontRef idx="minor">
+            <a:schemeClr val="tx1"/>
+          </a:fontRef>
+        </p:style>
+      </p:cxnSp>
+      <p:sp>
+        <p:nvSpPr>
+          <p:cNvPr id="42037" name="矩形 55">
+            <a:extLst>
+              <a:ext uri="{FF2B5EF4-FFF2-40B4-BE49-F238E27FC236}">
+                <a16:creationId xmlns:a16="http://schemas.microsoft.com/office/drawing/2014/main" id="{9E48DBE0-AA9A-7037-B403-2EBB98BD7AE9}"/>
+              </a:ext>
+            </a:extLst>
+          </p:cNvPr>
+          <p:cNvSpPr/>
+          <p:nvPr/>
+        </p:nvSpPr>
+        <p:spPr>
+          <a:xfrm>
+            <a:off x="5346179" y="4380353"/>
+            <a:ext cx="1257297" cy="338554"/>
+          </a:xfrm>
+          <a:prstGeom prst="rect">
+            <a:avLst/>
+          </a:prstGeom>
+          <a:noFill/>
+          <a:ln w="9525">
+            <a:noFill/>
+          </a:ln>
+        </p:spPr>
+        <p:txBody>
+          <a:bodyPr wrap="square">
+            <a:spAutoFit/>
+          </a:bodyPr>
+          <a:lstStyle/>
+          <a:p>
+            <a:pPr algn="ctr" eaLnBrk="1" hangingPunct="1"/>
+            <a:r>
+              <a:rPr lang="en-US" altLang="zh-CN" sz="1600" dirty="0">
+                <a:solidFill>
+                  <a:schemeClr val="bg1"/>
+                </a:solidFill>
+                <a:latin typeface="Montserrat" panose="00000500000000000000" charset="0"/>
+                <a:ea typeface="Montserrat" panose="00000500000000000000" charset="0"/>
+                <a:cs typeface="Montserrat" panose="00000500000000000000" charset="0"/>
+              </a:rPr>
+              <a:t>98%</a:t>
+            </a:r>
+          </a:p>
+        </p:txBody>
+      </p:sp>
+      <p:sp>
+        <p:nvSpPr>
+          <p:cNvPr id="42038" name="矩形 55">
+            <a:extLst>
+              <a:ext uri="{FF2B5EF4-FFF2-40B4-BE49-F238E27FC236}">
+                <a16:creationId xmlns:a16="http://schemas.microsoft.com/office/drawing/2014/main" id="{2D5C1132-323F-2B85-B6D0-DB823E21CD3D}"/>
+              </a:ext>
+            </a:extLst>
+          </p:cNvPr>
+          <p:cNvSpPr/>
+          <p:nvPr/>
+        </p:nvSpPr>
+        <p:spPr>
+          <a:xfrm>
+            <a:off x="2822092" y="4379966"/>
+            <a:ext cx="1106600" cy="338554"/>
+          </a:xfrm>
+          <a:prstGeom prst="rect">
+            <a:avLst/>
+          </a:prstGeom>
+          <a:noFill/>
+          <a:ln w="9525">
+            <a:noFill/>
+          </a:ln>
+        </p:spPr>
+        <p:txBody>
+          <a:bodyPr wrap="square">
+            <a:spAutoFit/>
+          </a:bodyPr>
+          <a:lstStyle/>
+          <a:p>
+            <a:pPr algn="ctr" eaLnBrk="1" hangingPunct="1"/>
+            <a:r>
+              <a:rPr lang="en-US" altLang="zh-CN" sz="1600" dirty="0">
+                <a:solidFill>
+                  <a:schemeClr val="bg1"/>
+                </a:solidFill>
+                <a:latin typeface="Montserrat" panose="00000500000000000000" charset="0"/>
+                <a:ea typeface="Montserrat" panose="00000500000000000000" charset="0"/>
+                <a:cs typeface="Montserrat" panose="00000500000000000000" charset="0"/>
+              </a:rPr>
+              <a:t>95%</a:t>
+            </a:r>
+          </a:p>
+        </p:txBody>
+      </p:sp>
+      <p:sp>
+        <p:nvSpPr>
+          <p:cNvPr id="42047" name="矩形 55">
+            <a:extLst>
+              <a:ext uri="{FF2B5EF4-FFF2-40B4-BE49-F238E27FC236}">
+                <a16:creationId xmlns:a16="http://schemas.microsoft.com/office/drawing/2014/main" id="{15610AA4-9E86-30DA-118D-E73B4506B47D}"/>
+              </a:ext>
+            </a:extLst>
+          </p:cNvPr>
+          <p:cNvSpPr/>
+          <p:nvPr/>
+        </p:nvSpPr>
+        <p:spPr>
+          <a:xfrm>
+            <a:off x="582289" y="1030213"/>
+            <a:ext cx="7247255" cy="584775"/>
+          </a:xfrm>
+          <a:prstGeom prst="rect">
+            <a:avLst/>
+          </a:prstGeom>
+          <a:noFill/>
+          <a:ln w="9525">
+            <a:noFill/>
+          </a:ln>
+        </p:spPr>
+        <p:txBody>
+          <a:bodyPr wrap="square">
+            <a:spAutoFit/>
+          </a:bodyPr>
+          <a:lstStyle/>
+          <a:p>
+            <a:pPr eaLnBrk="1" hangingPunct="1"/>
+            <a:r>
+              <a:rPr lang="en-US" altLang="zh-CN" sz="1600" dirty="0">
+                <a:solidFill>
+                  <a:schemeClr val="bg1"/>
+                </a:solidFill>
+                <a:latin typeface="Montserrat" panose="00000500000000000000" charset="0"/>
+                <a:ea typeface="Montserrat" panose="00000500000000000000" charset="0"/>
+                <a:cs typeface="Montserrat" panose="00000500000000000000" charset="0"/>
+              </a:rPr>
+              <a:t>Both CNN and VGG16 model have the same number of </a:t>
+            </a:r>
+            <a:r>
+              <a:rPr lang="en-US" altLang="zh-CN" sz="1600" b="1" dirty="0">
+                <a:solidFill>
+                  <a:schemeClr val="bg1"/>
+                </a:solidFill>
+                <a:latin typeface="Montserrat" panose="00000500000000000000" charset="0"/>
+                <a:ea typeface="Montserrat" panose="00000500000000000000" charset="0"/>
+                <a:cs typeface="Montserrat" panose="00000500000000000000" charset="0"/>
+              </a:rPr>
+              <a:t>epochs </a:t>
+            </a:r>
+            <a:r>
+              <a:rPr lang="en-US" altLang="zh-CN" sz="1600" b="1" i="1" dirty="0">
+                <a:solidFill>
+                  <a:schemeClr val="bg1"/>
+                </a:solidFill>
+                <a:latin typeface="Montserrat" panose="00000500000000000000" charset="0"/>
+                <a:ea typeface="Montserrat" panose="00000500000000000000" charset="0"/>
+                <a:cs typeface="Montserrat" panose="00000500000000000000" charset="0"/>
+              </a:rPr>
+              <a:t>10</a:t>
+            </a:r>
+            <a:r>
+              <a:rPr lang="en-US" altLang="zh-CN" sz="1600" b="1" dirty="0">
+                <a:solidFill>
+                  <a:schemeClr val="bg1"/>
+                </a:solidFill>
+                <a:latin typeface="Montserrat" panose="00000500000000000000" charset="0"/>
+                <a:ea typeface="Montserrat" panose="00000500000000000000" charset="0"/>
+                <a:cs typeface="Montserrat" panose="00000500000000000000" charset="0"/>
+              </a:rPr>
+              <a:t> </a:t>
+            </a:r>
+            <a:r>
+              <a:rPr lang="en-US" altLang="zh-CN" sz="1600" dirty="0">
+                <a:solidFill>
+                  <a:schemeClr val="bg1"/>
+                </a:solidFill>
+                <a:latin typeface="Montserrat" panose="00000500000000000000" charset="0"/>
+                <a:ea typeface="Montserrat" panose="00000500000000000000" charset="0"/>
+                <a:cs typeface="Montserrat" panose="00000500000000000000" charset="0"/>
+              </a:rPr>
+              <a:t>and same </a:t>
+            </a:r>
+            <a:r>
+              <a:rPr lang="en-US" altLang="zh-CN" sz="1600" b="1" dirty="0">
+                <a:solidFill>
+                  <a:schemeClr val="bg1"/>
+                </a:solidFill>
+                <a:latin typeface="Montserrat" panose="00000500000000000000" charset="0"/>
+                <a:ea typeface="Montserrat" panose="00000500000000000000" charset="0"/>
+                <a:cs typeface="Montserrat" panose="00000500000000000000" charset="0"/>
+              </a:rPr>
+              <a:t>input size </a:t>
+            </a:r>
+            <a:r>
+              <a:rPr lang="en-US" altLang="zh-CN" sz="1600" b="1" i="1" dirty="0">
+                <a:solidFill>
+                  <a:schemeClr val="bg1"/>
+                </a:solidFill>
+                <a:latin typeface="Montserrat" panose="00000500000000000000" charset="0"/>
+                <a:ea typeface="Montserrat" panose="00000500000000000000" charset="0"/>
+                <a:cs typeface="Montserrat" panose="00000500000000000000" charset="0"/>
+              </a:rPr>
+              <a:t>244 x 244</a:t>
+            </a:r>
+            <a:r>
+              <a:rPr lang="en-US" altLang="zh-CN" sz="1600" b="1" dirty="0">
+                <a:solidFill>
+                  <a:schemeClr val="bg1"/>
+                </a:solidFill>
+                <a:latin typeface="Montserrat" panose="00000500000000000000" charset="0"/>
+                <a:ea typeface="Montserrat" panose="00000500000000000000" charset="0"/>
+                <a:cs typeface="Montserrat" panose="00000500000000000000" charset="0"/>
+              </a:rPr>
+              <a:t>.</a:t>
+            </a:r>
+          </a:p>
+        </p:txBody>
+      </p:sp>
+    </p:spTree>
+  </p:cSld>
+  <p:clrMapOvr>
+    <a:masterClrMapping/>
+  </p:clrMapOvr>
+  <p:transition spd="slow">
+    <p:fade/>
+  </p:transition>
+  <p:timing>
+    <p:tnLst>
+      <p:par>
+        <p:cTn id="1" dur="indefinite" restart="never" nodeType="tmRoot">
+          <p:childTnLst>
+            <p:seq concurrent="1" nextAc="seek">
+              <p:cTn id="2" dur="indefinite" nodeType="mainSeq">
+                <p:childTnLst>
+                  <p:par>
+                    <p:cTn id="3" fill="hold">
+                      <p:stCondLst>
+                        <p:cond delay="indefinite"/>
+                        <p:cond evt="onBegin" delay="0">
+                          <p:tn val="2"/>
+                        </p:cond>
+                      </p:stCondLst>
+                      <p:childTnLst>
+                        <p:par>
+                          <p:cTn id="4" fill="hold">
+                            <p:stCondLst>
+                              <p:cond delay="0"/>
+                            </p:stCondLst>
+                            <p:childTnLst>
+                              <p:par>
+                                <p:cTn id="5" presetID="53" presetClass="entr" presetSubtype="16" fill="hold" grpId="0" nodeType="afterEffect">
+                                  <p:stCondLst>
+                                    <p:cond delay="0"/>
+                                  </p:stCondLst>
+                                  <p:childTnLst>
+                                    <p:set>
+                                      <p:cBhvr>
+                                        <p:cTn id="6" dur="1" fill="hold">
+                                          <p:stCondLst>
+                                            <p:cond delay="0"/>
+                                          </p:stCondLst>
+                                        </p:cTn>
+                                        <p:tgtEl>
+                                          <p:spTgt spid="3"/>
+                                        </p:tgtEl>
+                                        <p:attrNameLst>
+                                          <p:attrName>style.visibility</p:attrName>
+                                        </p:attrNameLst>
+                                      </p:cBhvr>
+                                      <p:to>
+                                        <p:strVal val="visible"/>
+                                      </p:to>
+                                    </p:set>
+                                    <p:anim calcmode="lin" valueType="num">
+                                      <p:cBhvr>
+                                        <p:cTn id="7" dur="250" fill="hold"/>
+                                        <p:tgtEl>
+                                          <p:spTgt spid="3"/>
+                                        </p:tgtEl>
+                                        <p:attrNameLst>
+                                          <p:attrName>ppt_w</p:attrName>
+                                        </p:attrNameLst>
+                                      </p:cBhvr>
+                                      <p:tavLst>
+                                        <p:tav tm="0">
+                                          <p:val>
+                                            <p:fltVal val="0"/>
+                                          </p:val>
+                                        </p:tav>
+                                        <p:tav tm="100000">
+                                          <p:val>
+                                            <p:strVal val="#ppt_w"/>
+                                          </p:val>
+                                        </p:tav>
+                                      </p:tavLst>
+                                    </p:anim>
+                                    <p:anim calcmode="lin" valueType="num">
+                                      <p:cBhvr>
+                                        <p:cTn id="8" dur="250" fill="hold"/>
+                                        <p:tgtEl>
+                                          <p:spTgt spid="3"/>
+                                        </p:tgtEl>
+                                        <p:attrNameLst>
+                                          <p:attrName>ppt_h</p:attrName>
+                                        </p:attrNameLst>
+                                      </p:cBhvr>
+                                      <p:tavLst>
+                                        <p:tav tm="0">
+                                          <p:val>
+                                            <p:fltVal val="0"/>
+                                          </p:val>
+                                        </p:tav>
+                                        <p:tav tm="100000">
+                                          <p:val>
+                                            <p:strVal val="#ppt_h"/>
+                                          </p:val>
+                                        </p:tav>
+                                      </p:tavLst>
+                                    </p:anim>
+                                    <p:animEffect transition="in" filter="fade">
+                                      <p:cBhvr>
+                                        <p:cTn id="9" dur="250"/>
+                                        <p:tgtEl>
+                                          <p:spTgt spid="3"/>
+                                        </p:tgtEl>
+                                      </p:cBhvr>
+                                    </p:animEffect>
+                                  </p:childTnLst>
+                                </p:cTn>
+                              </p:par>
+                              <p:par>
+                                <p:cTn id="10" presetID="6" presetClass="emph" presetSubtype="0" decel="100000" fill="hold" grpId="1" nodeType="withEffect">
+                                  <p:stCondLst>
+                                    <p:cond delay="200"/>
+                                  </p:stCondLst>
+                                  <p:childTnLst>
+                                    <p:animScale>
+                                      <p:cBhvr>
+                                        <p:cTn id="11" dur="250" fill="hold"/>
+                                        <p:tgtEl>
+                                          <p:spTgt spid="3"/>
+                                        </p:tgtEl>
+                                      </p:cBhvr>
+                                      <p:by x="110000" y="110000"/>
+                                    </p:animScale>
+                                  </p:childTnLst>
+                                </p:cTn>
+                              </p:par>
+                              <p:par>
+                                <p:cTn id="12" presetID="6" presetClass="emph" presetSubtype="0" decel="100000" fill="hold" grpId="2" nodeType="withEffect">
+                                  <p:stCondLst>
+                                    <p:cond delay="300"/>
+                                  </p:stCondLst>
+                                  <p:childTnLst>
+                                    <p:animScale>
+                                      <p:cBhvr>
+                                        <p:cTn id="13" dur="250" fill="hold"/>
+                                        <p:tgtEl>
+                                          <p:spTgt spid="3"/>
+                                        </p:tgtEl>
+                                      </p:cBhvr>
+                                      <p:by x="91000" y="91000"/>
+                                    </p:animScale>
+                                  </p:childTnLst>
+                                </p:cTn>
+                              </p:par>
+                            </p:childTnLst>
+                          </p:cTn>
+                        </p:par>
+                        <p:par>
+                          <p:cTn id="14" fill="hold">
+                            <p:stCondLst>
+                              <p:cond delay="550"/>
+                            </p:stCondLst>
+                            <p:childTnLst>
+                              <p:par>
+                                <p:cTn id="15" presetID="2" presetClass="entr" presetSubtype="8" decel="66700" fill="hold" nodeType="afterEffect">
+                                  <p:stCondLst>
+                                    <p:cond delay="0"/>
+                                  </p:stCondLst>
+                                  <p:childTnLst>
+                                    <p:set>
+                                      <p:cBhvr>
+                                        <p:cTn id="16" dur="1" fill="hold">
+                                          <p:stCondLst>
+                                            <p:cond delay="0"/>
+                                          </p:stCondLst>
+                                        </p:cTn>
+                                        <p:tgtEl>
+                                          <p:spTgt spid="4"/>
+                                        </p:tgtEl>
+                                        <p:attrNameLst>
+                                          <p:attrName>style.visibility</p:attrName>
+                                        </p:attrNameLst>
+                                      </p:cBhvr>
+                                      <p:to>
+                                        <p:strVal val="visible"/>
+                                      </p:to>
+                                    </p:set>
+                                    <p:anim calcmode="lin" valueType="num">
+                                      <p:cBhvr additive="base">
+                                        <p:cTn id="17" dur="400" fill="hold"/>
+                                        <p:tgtEl>
+                                          <p:spTgt spid="4"/>
+                                        </p:tgtEl>
+                                        <p:attrNameLst>
+                                          <p:attrName>ppt_x</p:attrName>
+                                        </p:attrNameLst>
+                                      </p:cBhvr>
+                                      <p:tavLst>
+                                        <p:tav tm="0">
+                                          <p:val>
+                                            <p:strVal val="0-#ppt_w/2"/>
+                                          </p:val>
+                                        </p:tav>
+                                        <p:tav tm="100000">
+                                          <p:val>
+                                            <p:strVal val="#ppt_x"/>
+                                          </p:val>
+                                        </p:tav>
+                                      </p:tavLst>
+                                    </p:anim>
+                                    <p:anim calcmode="lin" valueType="num">
+                                      <p:cBhvr additive="base">
+                                        <p:cTn id="18" dur="400" fill="hold"/>
+                                        <p:tgtEl>
+                                          <p:spTgt spid="4"/>
+                                        </p:tgtEl>
+                                        <p:attrNameLst>
+                                          <p:attrName>ppt_y</p:attrName>
+                                        </p:attrNameLst>
+                                      </p:cBhvr>
+                                      <p:tavLst>
+                                        <p:tav tm="0">
+                                          <p:val>
+                                            <p:strVal val="#ppt_y"/>
+                                          </p:val>
+                                        </p:tav>
+                                        <p:tav tm="100000">
+                                          <p:val>
+                                            <p:strVal val="#ppt_y"/>
+                                          </p:val>
+                                        </p:tav>
+                                      </p:tavLst>
+                                    </p:anim>
+                                  </p:childTnLst>
+                                </p:cTn>
+                              </p:par>
+                              <p:par>
+                                <p:cTn id="19" presetID="2" presetClass="entr" presetSubtype="2" decel="66700" fill="hold" nodeType="withEffect">
+                                  <p:stCondLst>
+                                    <p:cond delay="200"/>
+                                  </p:stCondLst>
+                                  <p:childTnLst>
+                                    <p:set>
+                                      <p:cBhvr>
+                                        <p:cTn id="20" dur="1" fill="hold">
+                                          <p:stCondLst>
+                                            <p:cond delay="0"/>
+                                          </p:stCondLst>
+                                        </p:cTn>
+                                        <p:tgtEl>
+                                          <p:spTgt spid="7"/>
+                                        </p:tgtEl>
+                                        <p:attrNameLst>
+                                          <p:attrName>style.visibility</p:attrName>
+                                        </p:attrNameLst>
+                                      </p:cBhvr>
+                                      <p:to>
+                                        <p:strVal val="visible"/>
+                                      </p:to>
+                                    </p:set>
+                                    <p:anim calcmode="lin" valueType="num">
+                                      <p:cBhvr additive="base">
+                                        <p:cTn id="21" dur="400" fill="hold"/>
+                                        <p:tgtEl>
+                                          <p:spTgt spid="7"/>
+                                        </p:tgtEl>
+                                        <p:attrNameLst>
+                                          <p:attrName>ppt_x</p:attrName>
+                                        </p:attrNameLst>
+                                      </p:cBhvr>
+                                      <p:tavLst>
+                                        <p:tav tm="0">
+                                          <p:val>
+                                            <p:strVal val="1+#ppt_w/2"/>
+                                          </p:val>
+                                        </p:tav>
+                                        <p:tav tm="100000">
+                                          <p:val>
+                                            <p:strVal val="#ppt_x"/>
+                                          </p:val>
+                                        </p:tav>
+                                      </p:tavLst>
+                                    </p:anim>
+                                    <p:anim calcmode="lin" valueType="num">
+                                      <p:cBhvr additive="base">
+                                        <p:cTn id="22" dur="400" fill="hold"/>
+                                        <p:tgtEl>
+                                          <p:spTgt spid="7"/>
+                                        </p:tgtEl>
+                                        <p:attrNameLst>
+                                          <p:attrName>ppt_y</p:attrName>
+                                        </p:attrNameLst>
+                                      </p:cBhvr>
+                                      <p:tavLst>
+                                        <p:tav tm="0">
+                                          <p:val>
+                                            <p:strVal val="#ppt_y"/>
+                                          </p:val>
+                                        </p:tav>
+                                        <p:tav tm="100000">
+                                          <p:val>
+                                            <p:strVal val="#ppt_y"/>
+                                          </p:val>
+                                        </p:tav>
+                                      </p:tavLst>
+                                    </p:anim>
+                                  </p:childTnLst>
+                                </p:cTn>
+                              </p:par>
+                            </p:childTnLst>
+                          </p:cTn>
+                        </p:par>
+                      </p:childTnLst>
+                    </p:cTn>
+                  </p:par>
+                </p:childTnLst>
+              </p:cTn>
+              <p:prevCondLst>
+                <p:cond evt="onPrev" delay="0">
+                  <p:tgtEl>
+                    <p:sldTgt/>
+                  </p:tgtEl>
+                </p:cond>
+              </p:prevCondLst>
+              <p:nextCondLst>
+                <p:cond evt="onNext" delay="0">
+                  <p:tgtEl>
+                    <p:sldTgt/>
+                  </p:tgtEl>
+                </p:cond>
+              </p:nextCondLst>
+            </p:seq>
+          </p:childTnLst>
+        </p:cTn>
+      </p:par>
+    </p:tnLst>
+    <p:bldLst>
+      <p:bldP spid="3" grpId="0" animBg="1"/>
+      <p:bldP spid="3" grpId="1" animBg="1"/>
+      <p:bldP spid="3" grpId="2" animBg="1"/>
+    </p:bldLst>
+  </p:timing>
+</p:sld>
+</file>
+
+<file path=ppt/slides/slide16.xml><?xml version="1.0" encoding="utf-8"?>
+<p:sld xmlns:a="http://schemas.openxmlformats.org/drawingml/2006/main" xmlns:r="http://schemas.openxmlformats.org/officeDocument/2006/relationships" xmlns:p="http://schemas.openxmlformats.org/presentationml/2006/main">
+  <p:cSld>
+    <p:spTree>
+      <p:nvGrpSpPr>
+        <p:cNvPr id="1" name=""/>
+        <p:cNvGrpSpPr/>
+        <p:nvPr/>
+      </p:nvGrpSpPr>
+      <p:grpSpPr>
+        <a:xfrm>
+          <a:off x="0" y="0"/>
+          <a:ext cx="0" cy="0"/>
+          <a:chOff x="0" y="0"/>
+          <a:chExt cx="0" cy="0"/>
+        </a:xfrm>
+      </p:grpSpPr>
+      <p:sp>
+        <p:nvSpPr>
           <p:cNvPr id="17424" name="矩形 55"/>
           <p:cNvSpPr/>
           <p:nvPr/>
@@ -19284,7 +21206,7 @@
           </a:ln>
         </p:spPr>
         <p:txBody>
-          <a:bodyPr wrap="none">
+          <a:bodyPr wrap="square">
             <a:spAutoFit/>
           </a:bodyPr>
           <a:lstStyle/>
@@ -19362,7 +21284,7 @@
         <p:spPr>
           <a:xfrm>
             <a:off x="544190" y="1119882"/>
-            <a:ext cx="7817084" cy="738664"/>
+            <a:ext cx="7817084" cy="523220"/>
           </a:xfrm>
           <a:prstGeom prst="rect">
             <a:avLst/>
@@ -19390,58 +21312,11 @@
                 <a:ea typeface="Montserrat" panose="00000500000000000000" charset="0"/>
                 <a:cs typeface="Montserrat" panose="00000500000000000000" charset="0"/>
               </a:rPr>
-              <a:t>The VGG-16 model architecture is a convolutional neural network (CNN) that was proposed by the Visual Geometry Group (VGG) at the University of Oxford. It gained popularity and became a widely used model for image classification tasks.</a:t>
+              <a:t>The VGG-16 model architecture is a convolutional neural network (CNN) that was proposed by the Visual Geometry Group (VGG).</a:t>
             </a:r>
           </a:p>
         </p:txBody>
       </p:sp>
-      <p:pic>
-        <p:nvPicPr>
-          <p:cNvPr id="1026" name="Picture 2" descr="An Advanced VGG16 Architecture-Based Deep Learning Model to Detect Pneumonia  from Medical Images | SpringerLink">
-            <a:extLst>
-              <a:ext uri="{FF2B5EF4-FFF2-40B4-BE49-F238E27FC236}">
-                <a16:creationId xmlns:a16="http://schemas.microsoft.com/office/drawing/2014/main" id="{A9FB6724-1DAF-FDC5-8BF6-4659934A97AF}"/>
-              </a:ext>
-            </a:extLst>
-          </p:cNvPr>
-          <p:cNvPicPr>
-            <a:picLocks noChangeAspect="1" noChangeArrowheads="1"/>
-          </p:cNvPicPr>
-          <p:nvPr/>
-        </p:nvPicPr>
-        <p:blipFill>
-          <a:blip r:embed="rId3">
-            <a:extLst>
-              <a:ext uri="{28A0092B-C50C-407E-A947-70E740481C1C}">
-                <a14:useLocalDpi xmlns:a14="http://schemas.microsoft.com/office/drawing/2010/main" val="0"/>
-              </a:ext>
-            </a:extLst>
-          </a:blip>
-          <a:srcRect/>
-          <a:stretch>
-            <a:fillRect/>
-          </a:stretch>
-        </p:blipFill>
-        <p:spPr bwMode="auto">
-          <a:xfrm>
-            <a:off x="1129459" y="2084621"/>
-            <a:ext cx="6524625" cy="2724150"/>
-          </a:xfrm>
-          <a:prstGeom prst="rect">
-            <a:avLst/>
-          </a:prstGeom>
-          <a:noFill/>
-          <a:extLst>
-            <a:ext uri="{909E8E84-426E-40DD-AFC4-6F175D3DCCD1}">
-              <a14:hiddenFill xmlns:a14="http://schemas.microsoft.com/office/drawing/2010/main">
-                <a:solidFill>
-                  <a:srgbClr val="FFFFFF"/>
-                </a:solidFill>
-              </a14:hiddenFill>
-            </a:ext>
-          </a:extLst>
-        </p:spPr>
-      </p:pic>
     </p:spTree>
     <p:extLst>
       <p:ext uri="{BB962C8B-B14F-4D97-AF65-F5344CB8AC3E}">
@@ -19458,7 +21333,7 @@
 </p:sld>
 </file>
 
-<file path=ppt/slides/slide16.xml><?xml version="1.0" encoding="utf-8"?>
+<file path=ppt/slides/slide17.xml><?xml version="1.0" encoding="utf-8"?>
 <p:sld xmlns:a="http://schemas.openxmlformats.org/drawingml/2006/main" xmlns:r="http://schemas.openxmlformats.org/officeDocument/2006/relationships" xmlns:p="http://schemas.openxmlformats.org/presentationml/2006/main">
   <p:cSld>
     <p:spTree>
@@ -19577,7 +21452,7 @@
           <p:nvPr>
             <p:extLst>
               <p:ext uri="{D42A27DB-BD31-4B8C-83A1-F6EECF244321}">
-                <p14:modId xmlns:p14="http://schemas.microsoft.com/office/powerpoint/2010/main" val="1886603260"/>
+                <p14:modId xmlns:p14="http://schemas.microsoft.com/office/powerpoint/2010/main" val="3697779118"/>
               </p:ext>
             </p:extLst>
           </p:nvPr>
@@ -19608,7 +21483,7 @@
 </p:sld>
 </file>
 
-<file path=ppt/slides/slide17.xml><?xml version="1.0" encoding="utf-8"?>
+<file path=ppt/slides/slide18.xml><?xml version="1.0" encoding="utf-8"?>
 <p:sld xmlns:a="http://schemas.openxmlformats.org/drawingml/2006/main" xmlns:r="http://schemas.openxmlformats.org/officeDocument/2006/relationships" xmlns:p="http://schemas.openxmlformats.org/presentationml/2006/main">
   <p:cSld>
     <p:spTree>
@@ -21888,7 +23763,7 @@
 </p:sld>
 </file>
 
-<file path=ppt/slides/slide18.xml><?xml version="1.0" encoding="utf-8"?>
+<file path=ppt/slides/slide19.xml><?xml version="1.0" encoding="utf-8"?>
 <p:sld xmlns:a="http://schemas.openxmlformats.org/drawingml/2006/main" xmlns:r="http://schemas.openxmlformats.org/officeDocument/2006/relationships" xmlns:p="http://schemas.openxmlformats.org/presentationml/2006/main">
   <p:cSld>
     <p:spTree>
@@ -22095,879 +23970,6 @@
   <p:clrMapOvr>
     <a:masterClrMapping/>
   </p:clrMapOvr>
-</p:sld>
-</file>
-
-<file path=ppt/slides/slide19.xml><?xml version="1.0" encoding="utf-8"?>
-<p:sld xmlns:a="http://schemas.openxmlformats.org/drawingml/2006/main" xmlns:r="http://schemas.openxmlformats.org/officeDocument/2006/relationships" xmlns:p="http://schemas.openxmlformats.org/presentationml/2006/main">
-  <p:cSld>
-    <p:spTree>
-      <p:nvGrpSpPr>
-        <p:cNvPr id="1" name=""/>
-        <p:cNvGrpSpPr/>
-        <p:nvPr/>
-      </p:nvGrpSpPr>
-      <p:grpSpPr>
-        <a:xfrm>
-          <a:off x="0" y="0"/>
-          <a:ext cx="0" cy="0"/>
-          <a:chOff x="0" y="0"/>
-          <a:chExt cx="0" cy="0"/>
-        </a:xfrm>
-      </p:grpSpPr>
-      <p:grpSp>
-        <p:nvGrpSpPr>
-          <p:cNvPr id="23" name="组合 22"/>
-          <p:cNvGrpSpPr/>
-          <p:nvPr/>
-        </p:nvGrpSpPr>
-        <p:grpSpPr>
-          <a:xfrm>
-            <a:off x="2904490" y="1944688"/>
-            <a:ext cx="5355590" cy="2170767"/>
-            <a:chOff x="4070982" y="2019402"/>
-            <a:chExt cx="3752293" cy="2170346"/>
-          </a:xfrm>
-        </p:grpSpPr>
-        <p:sp>
-          <p:nvSpPr>
-            <p:cNvPr id="52231" name="文本框 23"/>
-            <p:cNvSpPr txBox="1"/>
-            <p:nvPr/>
-          </p:nvSpPr>
-          <p:spPr>
-            <a:xfrm>
-              <a:off x="4070982" y="2251132"/>
-              <a:ext cx="3752293" cy="1938616"/>
-            </a:xfrm>
-            <a:prstGeom prst="rect">
-              <a:avLst/>
-            </a:prstGeom>
-            <a:noFill/>
-            <a:ln w="9525">
-              <a:noFill/>
-            </a:ln>
-          </p:spPr>
-          <p:txBody>
-            <a:bodyPr wrap="square">
-              <a:spAutoFit/>
-            </a:bodyPr>
-            <a:lstStyle/>
-            <a:p>
-              <a:r>
-                <a:rPr lang="en-US" altLang="zh-CN" sz="4000" dirty="0">
-                  <a:solidFill>
-                    <a:schemeClr val="bg1"/>
-                  </a:solidFill>
-                  <a:latin typeface="Montserrat" panose="00000500000000000000" charset="0"/>
-                  <a:ea typeface="Montserrat" panose="00000500000000000000" charset="0"/>
-                  <a:cs typeface="Montserrat" panose="00000500000000000000" charset="0"/>
-                </a:rPr>
-                <a:t>Future Enhancements</a:t>
-              </a:r>
-              <a:endParaRPr lang="zh-CN" altLang="en-US" sz="4000" dirty="0">
-                <a:solidFill>
-                  <a:schemeClr val="bg1"/>
-                </a:solidFill>
-                <a:latin typeface="Montserrat" panose="00000500000000000000" charset="0"/>
-                <a:ea typeface="Montserrat" panose="00000500000000000000" charset="0"/>
-                <a:cs typeface="Montserrat" panose="00000500000000000000" charset="0"/>
-              </a:endParaRPr>
-            </a:p>
-          </p:txBody>
-        </p:sp>
-        <p:sp>
-          <p:nvSpPr>
-            <p:cNvPr id="52232" name="文本框 35"/>
-            <p:cNvSpPr txBox="1"/>
-            <p:nvPr/>
-          </p:nvSpPr>
-          <p:spPr>
-            <a:xfrm>
-              <a:off x="4118308" y="2019402"/>
-              <a:ext cx="1331264" cy="307777"/>
-            </a:xfrm>
-            <a:prstGeom prst="rect">
-              <a:avLst/>
-            </a:prstGeom>
-            <a:noFill/>
-            <a:ln w="9525">
-              <a:noFill/>
-            </a:ln>
-          </p:spPr>
-          <p:txBody>
-            <a:bodyPr>
-              <a:spAutoFit/>
-            </a:bodyPr>
-            <a:lstStyle/>
-            <a:p>
-              <a:pPr eaLnBrk="1" hangingPunct="1"/>
-              <a:r>
-                <a:rPr lang="en-US" altLang="zh-CN" sz="1400" dirty="0">
-                  <a:solidFill>
-                    <a:schemeClr val="bg1"/>
-                  </a:solidFill>
-                  <a:latin typeface="Montserrat" panose="00000500000000000000" charset="0"/>
-                  <a:ea typeface="Montserrat" panose="00000500000000000000" charset="0"/>
-                  <a:cs typeface="Montserrat" panose="00000500000000000000" charset="0"/>
-                </a:rPr>
-                <a:t>PART FIVE</a:t>
-              </a:r>
-              <a:endParaRPr lang="zh-CN" altLang="en-US" sz="1400" dirty="0">
-                <a:solidFill>
-                  <a:schemeClr val="bg1"/>
-                </a:solidFill>
-                <a:latin typeface="Montserrat" panose="00000500000000000000" charset="0"/>
-                <a:ea typeface="Montserrat" panose="00000500000000000000" charset="0"/>
-                <a:cs typeface="Montserrat" panose="00000500000000000000" charset="0"/>
-              </a:endParaRPr>
-            </a:p>
-          </p:txBody>
-        </p:sp>
-      </p:grpSp>
-      <p:grpSp>
-        <p:nvGrpSpPr>
-          <p:cNvPr id="37" name="组合 36"/>
-          <p:cNvGrpSpPr/>
-          <p:nvPr/>
-        </p:nvGrpSpPr>
-        <p:grpSpPr>
-          <a:xfrm>
-            <a:off x="1552893" y="1944688"/>
-            <a:ext cx="1128712" cy="1128712"/>
-            <a:chOff x="2817516" y="1944350"/>
-            <a:chExt cx="1129689" cy="1129689"/>
-          </a:xfrm>
-        </p:grpSpPr>
-        <p:sp>
-          <p:nvSpPr>
-            <p:cNvPr id="38" name="椭圆 37"/>
-            <p:cNvSpPr/>
-            <p:nvPr/>
-          </p:nvSpPr>
-          <p:spPr>
-            <a:xfrm>
-              <a:off x="2817516" y="1944350"/>
-              <a:ext cx="1129689" cy="1129689"/>
-            </a:xfrm>
-            <a:prstGeom prst="ellipse">
-              <a:avLst/>
-            </a:prstGeom>
-            <a:noFill/>
-            <a:ln>
-              <a:solidFill>
-                <a:schemeClr val="bg1"/>
-              </a:solidFill>
-            </a:ln>
-          </p:spPr>
-          <p:style>
-            <a:lnRef idx="2">
-              <a:schemeClr val="accent1">
-                <a:shade val="50000"/>
-              </a:schemeClr>
-            </a:lnRef>
-            <a:fillRef idx="1">
-              <a:schemeClr val="accent1"/>
-            </a:fillRef>
-            <a:effectRef idx="0">
-              <a:schemeClr val="accent1"/>
-            </a:effectRef>
-            <a:fontRef idx="minor">
-              <a:schemeClr val="lt1"/>
-            </a:fontRef>
-          </p:style>
-          <p:txBody>
-            <a:bodyPr anchor="ctr"/>
-            <a:lstStyle/>
-            <a:p>
-              <a:pPr marL="0" marR="0" lvl="0" indent="0" algn="ctr" defTabSz="685800" rtl="0" eaLnBrk="1" fontAlgn="auto" latinLnBrk="0" hangingPunct="1">
-                <a:lnSpc>
-                  <a:spcPct val="100000"/>
-                </a:lnSpc>
-                <a:spcBef>
-                  <a:spcPts val="0"/>
-                </a:spcBef>
-                <a:spcAft>
-                  <a:spcPts val="0"/>
-                </a:spcAft>
-                <a:buClrTx/>
-                <a:buSzTx/>
-                <a:buFontTx/>
-                <a:buNone/>
-                <a:defRPr/>
-              </a:pPr>
-              <a:endParaRPr kumimoji="0" lang="zh-CN" altLang="en-US" sz="1350" b="0" i="0" u="none" strike="noStrike" kern="1200" cap="none" spc="0" normalizeH="0" baseline="0" noProof="0" dirty="0">
-                <a:ln>
-                  <a:noFill/>
-                </a:ln>
-                <a:solidFill>
-                  <a:schemeClr val="bg1"/>
-                </a:solidFill>
-                <a:effectLst/>
-                <a:uLnTx/>
-                <a:uFillTx/>
-                <a:latin typeface="Montserrat" panose="00000500000000000000" charset="0"/>
-                <a:ea typeface="Montserrat" panose="00000500000000000000" charset="0"/>
-                <a:cs typeface="Montserrat" panose="00000500000000000000" charset="0"/>
-              </a:endParaRPr>
-            </a:p>
-          </p:txBody>
-        </p:sp>
-        <p:sp>
-          <p:nvSpPr>
-            <p:cNvPr id="39" name="Freeform 5"/>
-            <p:cNvSpPr>
-              <a:spLocks noEditPoints="1"/>
-            </p:cNvSpPr>
-            <p:nvPr/>
-          </p:nvSpPr>
-          <p:spPr bwMode="auto">
-            <a:xfrm>
-              <a:off x="3195668" y="2160437"/>
-              <a:ext cx="444885" cy="657794"/>
-            </a:xfrm>
-            <a:custGeom>
-              <a:avLst/>
-              <a:gdLst>
-                <a:gd name="T0" fmla="*/ 189 w 316"/>
-                <a:gd name="T1" fmla="*/ 16 h 467"/>
-                <a:gd name="T2" fmla="*/ 225 w 316"/>
-                <a:gd name="T3" fmla="*/ 7 h 467"/>
-                <a:gd name="T4" fmla="*/ 300 w 316"/>
-                <a:gd name="T5" fmla="*/ 52 h 467"/>
-                <a:gd name="T6" fmla="*/ 309 w 316"/>
-                <a:gd name="T7" fmla="*/ 89 h 467"/>
-                <a:gd name="T8" fmla="*/ 298 w 316"/>
-                <a:gd name="T9" fmla="*/ 105 h 467"/>
-                <a:gd name="T10" fmla="*/ 179 w 316"/>
-                <a:gd name="T11" fmla="*/ 33 h 467"/>
-                <a:gd name="T12" fmla="*/ 189 w 316"/>
-                <a:gd name="T13" fmla="*/ 16 h 467"/>
-                <a:gd name="T14" fmla="*/ 164 w 316"/>
-                <a:gd name="T15" fmla="*/ 58 h 467"/>
-                <a:gd name="T16" fmla="*/ 147 w 316"/>
-                <a:gd name="T17" fmla="*/ 85 h 467"/>
-                <a:gd name="T18" fmla="*/ 266 w 316"/>
-                <a:gd name="T19" fmla="*/ 157 h 467"/>
-                <a:gd name="T20" fmla="*/ 283 w 316"/>
-                <a:gd name="T21" fmla="*/ 130 h 467"/>
-                <a:gd name="T22" fmla="*/ 164 w 316"/>
-                <a:gd name="T23" fmla="*/ 58 h 467"/>
-                <a:gd name="T24" fmla="*/ 2 w 316"/>
-                <a:gd name="T25" fmla="*/ 446 h 467"/>
-                <a:gd name="T26" fmla="*/ 13 w 316"/>
-                <a:gd name="T27" fmla="*/ 354 h 467"/>
-                <a:gd name="T28" fmla="*/ 90 w 316"/>
-                <a:gd name="T29" fmla="*/ 401 h 467"/>
-                <a:gd name="T30" fmla="*/ 13 w 316"/>
-                <a:gd name="T31" fmla="*/ 453 h 467"/>
-                <a:gd name="T32" fmla="*/ 2 w 316"/>
-                <a:gd name="T33" fmla="*/ 446 h 467"/>
-                <a:gd name="T34" fmla="*/ 20 w 316"/>
-                <a:gd name="T35" fmla="*/ 296 h 467"/>
-                <a:gd name="T36" fmla="*/ 133 w 316"/>
-                <a:gd name="T37" fmla="*/ 109 h 467"/>
-                <a:gd name="T38" fmla="*/ 172 w 316"/>
-                <a:gd name="T39" fmla="*/ 133 h 467"/>
-                <a:gd name="T40" fmla="*/ 59 w 316"/>
-                <a:gd name="T41" fmla="*/ 320 h 467"/>
-                <a:gd name="T42" fmla="*/ 20 w 316"/>
-                <a:gd name="T43" fmla="*/ 296 h 467"/>
-                <a:gd name="T44" fmla="*/ 99 w 316"/>
-                <a:gd name="T45" fmla="*/ 344 h 467"/>
-                <a:gd name="T46" fmla="*/ 212 w 316"/>
-                <a:gd name="T47" fmla="*/ 158 h 467"/>
-                <a:gd name="T48" fmla="*/ 252 w 316"/>
-                <a:gd name="T49" fmla="*/ 182 h 467"/>
-                <a:gd name="T50" fmla="*/ 139 w 316"/>
-                <a:gd name="T51" fmla="*/ 368 h 467"/>
-                <a:gd name="T52" fmla="*/ 99 w 316"/>
-                <a:gd name="T53" fmla="*/ 344 h 467"/>
-                <a:gd name="T54" fmla="*/ 95 w 316"/>
-                <a:gd name="T55" fmla="*/ 446 h 467"/>
-                <a:gd name="T56" fmla="*/ 301 w 316"/>
-                <a:gd name="T57" fmla="*/ 446 h 467"/>
-                <a:gd name="T58" fmla="*/ 311 w 316"/>
-                <a:gd name="T59" fmla="*/ 456 h 467"/>
-                <a:gd name="T60" fmla="*/ 301 w 316"/>
-                <a:gd name="T61" fmla="*/ 467 h 467"/>
-                <a:gd name="T62" fmla="*/ 95 w 316"/>
-                <a:gd name="T63" fmla="*/ 467 h 467"/>
-                <a:gd name="T64" fmla="*/ 84 w 316"/>
-                <a:gd name="T65" fmla="*/ 456 h 467"/>
-                <a:gd name="T66" fmla="*/ 95 w 316"/>
-                <a:gd name="T67" fmla="*/ 446 h 467"/>
-              </a:gdLst>
-              <a:ahLst/>
-              <a:cxnLst>
-                <a:cxn ang="0">
-                  <a:pos x="T0" y="T1"/>
-                </a:cxn>
-                <a:cxn ang="0">
-                  <a:pos x="T2" y="T3"/>
-                </a:cxn>
-                <a:cxn ang="0">
-                  <a:pos x="T4" y="T5"/>
-                </a:cxn>
-                <a:cxn ang="0">
-                  <a:pos x="T6" y="T7"/>
-                </a:cxn>
-                <a:cxn ang="0">
-                  <a:pos x="T8" y="T9"/>
-                </a:cxn>
-                <a:cxn ang="0">
-                  <a:pos x="T10" y="T11"/>
-                </a:cxn>
-                <a:cxn ang="0">
-                  <a:pos x="T12" y="T13"/>
-                </a:cxn>
-                <a:cxn ang="0">
-                  <a:pos x="T14" y="T15"/>
-                </a:cxn>
-                <a:cxn ang="0">
-                  <a:pos x="T16" y="T17"/>
-                </a:cxn>
-                <a:cxn ang="0">
-                  <a:pos x="T18" y="T19"/>
-                </a:cxn>
-                <a:cxn ang="0">
-                  <a:pos x="T20" y="T21"/>
-                </a:cxn>
-                <a:cxn ang="0">
-                  <a:pos x="T22" y="T23"/>
-                </a:cxn>
-                <a:cxn ang="0">
-                  <a:pos x="T24" y="T25"/>
-                </a:cxn>
-                <a:cxn ang="0">
-                  <a:pos x="T26" y="T27"/>
-                </a:cxn>
-                <a:cxn ang="0">
-                  <a:pos x="T28" y="T29"/>
-                </a:cxn>
-                <a:cxn ang="0">
-                  <a:pos x="T30" y="T31"/>
-                </a:cxn>
-                <a:cxn ang="0">
-                  <a:pos x="T32" y="T33"/>
-                </a:cxn>
-                <a:cxn ang="0">
-                  <a:pos x="T34" y="T35"/>
-                </a:cxn>
-                <a:cxn ang="0">
-                  <a:pos x="T36" y="T37"/>
-                </a:cxn>
-                <a:cxn ang="0">
-                  <a:pos x="T38" y="T39"/>
-                </a:cxn>
-                <a:cxn ang="0">
-                  <a:pos x="T40" y="T41"/>
-                </a:cxn>
-                <a:cxn ang="0">
-                  <a:pos x="T42" y="T43"/>
-                </a:cxn>
-                <a:cxn ang="0">
-                  <a:pos x="T44" y="T45"/>
-                </a:cxn>
-                <a:cxn ang="0">
-                  <a:pos x="T46" y="T47"/>
-                </a:cxn>
-                <a:cxn ang="0">
-                  <a:pos x="T48" y="T49"/>
-                </a:cxn>
-                <a:cxn ang="0">
-                  <a:pos x="T50" y="T51"/>
-                </a:cxn>
-                <a:cxn ang="0">
-                  <a:pos x="T52" y="T53"/>
-                </a:cxn>
-                <a:cxn ang="0">
-                  <a:pos x="T54" y="T55"/>
-                </a:cxn>
-                <a:cxn ang="0">
-                  <a:pos x="T56" y="T57"/>
-                </a:cxn>
-                <a:cxn ang="0">
-                  <a:pos x="T58" y="T59"/>
-                </a:cxn>
-                <a:cxn ang="0">
-                  <a:pos x="T60" y="T61"/>
-                </a:cxn>
-                <a:cxn ang="0">
-                  <a:pos x="T62" y="T63"/>
-                </a:cxn>
-                <a:cxn ang="0">
-                  <a:pos x="T64" y="T65"/>
-                </a:cxn>
-                <a:cxn ang="0">
-                  <a:pos x="T66" y="T67"/>
-                </a:cxn>
-              </a:cxnLst>
-              <a:rect l="0" t="0" r="r" b="b"/>
-              <a:pathLst>
-                <a:path w="316" h="467">
-                  <a:moveTo>
-                    <a:pt x="189" y="16"/>
-                  </a:moveTo>
-                  <a:cubicBezTo>
-                    <a:pt x="197" y="4"/>
-                    <a:pt x="213" y="0"/>
-                    <a:pt x="225" y="7"/>
-                  </a:cubicBezTo>
-                  <a:cubicBezTo>
-                    <a:pt x="300" y="52"/>
-                    <a:pt x="300" y="52"/>
-                    <a:pt x="300" y="52"/>
-                  </a:cubicBezTo>
-                  <a:cubicBezTo>
-                    <a:pt x="312" y="60"/>
-                    <a:pt x="316" y="76"/>
-                    <a:pt x="309" y="89"/>
-                  </a:cubicBezTo>
-                  <a:cubicBezTo>
-                    <a:pt x="298" y="105"/>
-                    <a:pt x="298" y="105"/>
-                    <a:pt x="298" y="105"/>
-                  </a:cubicBezTo>
-                  <a:cubicBezTo>
-                    <a:pt x="179" y="33"/>
-                    <a:pt x="179" y="33"/>
-                    <a:pt x="179" y="33"/>
-                  </a:cubicBezTo>
-                  <a:lnTo>
-                    <a:pt x="189" y="16"/>
-                  </a:lnTo>
-                  <a:close/>
-                  <a:moveTo>
-                    <a:pt x="164" y="58"/>
-                  </a:moveTo>
-                  <a:cubicBezTo>
-                    <a:pt x="147" y="85"/>
-                    <a:pt x="147" y="85"/>
-                    <a:pt x="147" y="85"/>
-                  </a:cubicBezTo>
-                  <a:cubicBezTo>
-                    <a:pt x="266" y="157"/>
-                    <a:pt x="266" y="157"/>
-                    <a:pt x="266" y="157"/>
-                  </a:cubicBezTo>
-                  <a:cubicBezTo>
-                    <a:pt x="283" y="130"/>
-                    <a:pt x="283" y="130"/>
-                    <a:pt x="283" y="130"/>
-                  </a:cubicBezTo>
-                  <a:lnTo>
-                    <a:pt x="164" y="58"/>
-                  </a:lnTo>
-                  <a:close/>
-                  <a:moveTo>
-                    <a:pt x="2" y="446"/>
-                  </a:moveTo>
-                  <a:cubicBezTo>
-                    <a:pt x="13" y="354"/>
-                    <a:pt x="13" y="354"/>
-                    <a:pt x="13" y="354"/>
-                  </a:cubicBezTo>
-                  <a:cubicBezTo>
-                    <a:pt x="90" y="401"/>
-                    <a:pt x="90" y="401"/>
-                    <a:pt x="90" y="401"/>
-                  </a:cubicBezTo>
-                  <a:cubicBezTo>
-                    <a:pt x="13" y="453"/>
-                    <a:pt x="13" y="453"/>
-                    <a:pt x="13" y="453"/>
-                  </a:cubicBezTo>
-                  <a:cubicBezTo>
-                    <a:pt x="5" y="459"/>
-                    <a:pt x="0" y="456"/>
-                    <a:pt x="2" y="446"/>
-                  </a:cubicBezTo>
-                  <a:close/>
-                  <a:moveTo>
-                    <a:pt x="20" y="296"/>
-                  </a:moveTo>
-                  <a:cubicBezTo>
-                    <a:pt x="133" y="109"/>
-                    <a:pt x="133" y="109"/>
-                    <a:pt x="133" y="109"/>
-                  </a:cubicBezTo>
-                  <a:cubicBezTo>
-                    <a:pt x="172" y="133"/>
-                    <a:pt x="172" y="133"/>
-                    <a:pt x="172" y="133"/>
-                  </a:cubicBezTo>
-                  <a:cubicBezTo>
-                    <a:pt x="59" y="320"/>
-                    <a:pt x="59" y="320"/>
-                    <a:pt x="59" y="320"/>
-                  </a:cubicBezTo>
-                  <a:lnTo>
-                    <a:pt x="20" y="296"/>
-                  </a:lnTo>
-                  <a:close/>
-                  <a:moveTo>
-                    <a:pt x="99" y="344"/>
-                  </a:moveTo>
-                  <a:cubicBezTo>
-                    <a:pt x="212" y="158"/>
-                    <a:pt x="212" y="158"/>
-                    <a:pt x="212" y="158"/>
-                  </a:cubicBezTo>
-                  <a:cubicBezTo>
-                    <a:pt x="252" y="182"/>
-                    <a:pt x="252" y="182"/>
-                    <a:pt x="252" y="182"/>
-                  </a:cubicBezTo>
-                  <a:cubicBezTo>
-                    <a:pt x="139" y="368"/>
-                    <a:pt x="139" y="368"/>
-                    <a:pt x="139" y="368"/>
-                  </a:cubicBezTo>
-                  <a:lnTo>
-                    <a:pt x="99" y="344"/>
-                  </a:lnTo>
-                  <a:close/>
-                  <a:moveTo>
-                    <a:pt x="95" y="446"/>
-                  </a:moveTo>
-                  <a:cubicBezTo>
-                    <a:pt x="301" y="446"/>
-                    <a:pt x="301" y="446"/>
-                    <a:pt x="301" y="446"/>
-                  </a:cubicBezTo>
-                  <a:cubicBezTo>
-                    <a:pt x="307" y="446"/>
-                    <a:pt x="311" y="450"/>
-                    <a:pt x="311" y="456"/>
-                  </a:cubicBezTo>
-                  <a:cubicBezTo>
-                    <a:pt x="311" y="462"/>
-                    <a:pt x="307" y="467"/>
-                    <a:pt x="301" y="467"/>
-                  </a:cubicBezTo>
-                  <a:cubicBezTo>
-                    <a:pt x="95" y="467"/>
-                    <a:pt x="95" y="467"/>
-                    <a:pt x="95" y="467"/>
-                  </a:cubicBezTo>
-                  <a:cubicBezTo>
-                    <a:pt x="89" y="467"/>
-                    <a:pt x="84" y="462"/>
-                    <a:pt x="84" y="456"/>
-                  </a:cubicBezTo>
-                  <a:cubicBezTo>
-                    <a:pt x="84" y="450"/>
-                    <a:pt x="89" y="446"/>
-                    <a:pt x="95" y="446"/>
-                  </a:cubicBezTo>
-                  <a:close/>
-                </a:path>
-              </a:pathLst>
-            </a:custGeom>
-            <a:solidFill>
-              <a:schemeClr val="bg1"/>
-            </a:solidFill>
-            <a:ln>
-              <a:noFill/>
-            </a:ln>
-          </p:spPr>
-          <p:txBody>
-            <a:bodyPr/>
-            <a:lstStyle/>
-            <a:p>
-              <a:pPr marL="0" marR="0" lvl="0" indent="0" algn="l" defTabSz="685800" rtl="0" eaLnBrk="1" fontAlgn="auto" latinLnBrk="0" hangingPunct="1">
-                <a:lnSpc>
-                  <a:spcPct val="100000"/>
-                </a:lnSpc>
-                <a:spcBef>
-                  <a:spcPts val="0"/>
-                </a:spcBef>
-                <a:spcAft>
-                  <a:spcPts val="0"/>
-                </a:spcAft>
-                <a:buClrTx/>
-                <a:buSzTx/>
-                <a:buFontTx/>
-                <a:buNone/>
-                <a:defRPr/>
-              </a:pPr>
-              <a:endParaRPr kumimoji="0" lang="zh-CN" altLang="en-US" sz="1350" b="0" i="0" u="none" strike="noStrike" kern="1200" cap="none" spc="0" normalizeH="0" baseline="0" noProof="0" dirty="0">
-                <a:ln>
-                  <a:noFill/>
-                </a:ln>
-                <a:solidFill>
-                  <a:schemeClr val="bg1"/>
-                </a:solidFill>
-                <a:effectLst/>
-                <a:uLnTx/>
-                <a:uFillTx/>
-                <a:latin typeface="Montserrat" panose="00000500000000000000" charset="0"/>
-                <a:ea typeface="Montserrat" panose="00000500000000000000" charset="0"/>
-                <a:cs typeface="Montserrat" panose="00000500000000000000" charset="0"/>
-              </a:endParaRPr>
-            </a:p>
-          </p:txBody>
-        </p:sp>
-      </p:grpSp>
-    </p:spTree>
-  </p:cSld>
-  <p:clrMapOvr>
-    <a:masterClrMapping/>
-  </p:clrMapOvr>
-  <p:transition spd="slow">
-    <p:fade/>
-  </p:transition>
-  <p:timing>
-    <p:tnLst>
-      <p:par>
-        <p:cTn id="1" dur="indefinite" restart="never" nodeType="tmRoot">
-          <p:childTnLst>
-            <p:seq concurrent="1" nextAc="seek">
-              <p:cTn id="2" dur="indefinite" nodeType="mainSeq">
-                <p:childTnLst>
-                  <p:par>
-                    <p:cTn id="3" fill="hold">
-                      <p:stCondLst>
-                        <p:cond delay="indefinite"/>
-                        <p:cond evt="onBegin" delay="0">
-                          <p:tn val="2"/>
-                        </p:cond>
-                      </p:stCondLst>
-                      <p:childTnLst>
-                        <p:par>
-                          <p:cTn id="4" fill="hold">
-                            <p:stCondLst>
-                              <p:cond delay="0"/>
-                            </p:stCondLst>
-                            <p:childTnLst>
-                              <p:par>
-                                <p:cTn id="5" presetID="53" presetClass="entr" presetSubtype="16" fill="hold" nodeType="afterEffect">
-                                  <p:stCondLst>
-                                    <p:cond delay="0"/>
-                                  </p:stCondLst>
-                                  <p:childTnLst>
-                                    <p:set>
-                                      <p:cBhvr>
-                                        <p:cTn id="6" dur="1" fill="hold">
-                                          <p:stCondLst>
-                                            <p:cond delay="0"/>
-                                          </p:stCondLst>
-                                        </p:cTn>
-                                        <p:tgtEl>
-                                          <p:spTgt spid="37"/>
-                                        </p:tgtEl>
-                                        <p:attrNameLst>
-                                          <p:attrName>style.visibility</p:attrName>
-                                        </p:attrNameLst>
-                                      </p:cBhvr>
-                                      <p:to>
-                                        <p:strVal val="visible"/>
-                                      </p:to>
-                                    </p:set>
-                                    <p:anim calcmode="lin" valueType="num">
-                                      <p:cBhvr>
-                                        <p:cTn id="7" dur="250" fill="hold"/>
-                                        <p:tgtEl>
-                                          <p:spTgt spid="37"/>
-                                        </p:tgtEl>
-                                        <p:attrNameLst>
-                                          <p:attrName>ppt_w</p:attrName>
-                                        </p:attrNameLst>
-                                      </p:cBhvr>
-                                      <p:tavLst>
-                                        <p:tav tm="0">
-                                          <p:val>
-                                            <p:fltVal val="0"/>
-                                          </p:val>
-                                        </p:tav>
-                                        <p:tav tm="100000">
-                                          <p:val>
-                                            <p:strVal val="#ppt_w"/>
-                                          </p:val>
-                                        </p:tav>
-                                      </p:tavLst>
-                                    </p:anim>
-                                    <p:anim calcmode="lin" valueType="num">
-                                      <p:cBhvr>
-                                        <p:cTn id="8" dur="250" fill="hold"/>
-                                        <p:tgtEl>
-                                          <p:spTgt spid="37"/>
-                                        </p:tgtEl>
-                                        <p:attrNameLst>
-                                          <p:attrName>ppt_h</p:attrName>
-                                        </p:attrNameLst>
-                                      </p:cBhvr>
-                                      <p:tavLst>
-                                        <p:tav tm="0">
-                                          <p:val>
-                                            <p:fltVal val="0"/>
-                                          </p:val>
-                                        </p:tav>
-                                        <p:tav tm="100000">
-                                          <p:val>
-                                            <p:strVal val="#ppt_h"/>
-                                          </p:val>
-                                        </p:tav>
-                                      </p:tavLst>
-                                    </p:anim>
-                                    <p:animEffect transition="in" filter="fade">
-                                      <p:cBhvr>
-                                        <p:cTn id="9" dur="250"/>
-                                        <p:tgtEl>
-                                          <p:spTgt spid="37"/>
-                                        </p:tgtEl>
-                                      </p:cBhvr>
-                                    </p:animEffect>
-                                  </p:childTnLst>
-                                </p:cTn>
-                              </p:par>
-                              <p:par>
-                                <p:cTn id="10" presetID="6" presetClass="emph" presetSubtype="0" decel="100000" fill="hold" nodeType="withEffect">
-                                  <p:stCondLst>
-                                    <p:cond delay="200"/>
-                                  </p:stCondLst>
-                                  <p:childTnLst>
-                                    <p:animScale>
-                                      <p:cBhvr>
-                                        <p:cTn id="11" dur="250" fill="hold"/>
-                                        <p:tgtEl>
-                                          <p:spTgt spid="37"/>
-                                        </p:tgtEl>
-                                      </p:cBhvr>
-                                      <p:by x="110000" y="110000"/>
-                                    </p:animScale>
-                                  </p:childTnLst>
-                                </p:cTn>
-                              </p:par>
-                              <p:par>
-                                <p:cTn id="12" presetID="6" presetClass="emph" presetSubtype="0" decel="100000" fill="hold" nodeType="withEffect">
-                                  <p:stCondLst>
-                                    <p:cond delay="400"/>
-                                  </p:stCondLst>
-                                  <p:childTnLst>
-                                    <p:animScale>
-                                      <p:cBhvr>
-                                        <p:cTn id="13" dur="250" fill="hold"/>
-                                        <p:tgtEl>
-                                          <p:spTgt spid="37"/>
-                                        </p:tgtEl>
-                                      </p:cBhvr>
-                                      <p:by x="91000" y="91000"/>
-                                    </p:animScale>
-                                  </p:childTnLst>
-                                </p:cTn>
-                              </p:par>
-                            </p:childTnLst>
-                          </p:cTn>
-                        </p:par>
-                        <p:par>
-                          <p:cTn id="14" fill="hold">
-                            <p:stCondLst>
-                              <p:cond delay="650"/>
-                            </p:stCondLst>
-                            <p:childTnLst>
-                              <p:par>
-                                <p:cTn id="15" presetID="2" presetClass="entr" presetSubtype="2" decel="100000" fill="hold" nodeType="afterEffect">
-                                  <p:stCondLst>
-                                    <p:cond delay="0"/>
-                                  </p:stCondLst>
-                                  <p:childTnLst>
-                                    <p:set>
-                                      <p:cBhvr>
-                                        <p:cTn id="16" dur="1" fill="hold">
-                                          <p:stCondLst>
-                                            <p:cond delay="0"/>
-                                          </p:stCondLst>
-                                        </p:cTn>
-                                        <p:tgtEl>
-                                          <p:spTgt spid="23"/>
-                                        </p:tgtEl>
-                                        <p:attrNameLst>
-                                          <p:attrName>style.visibility</p:attrName>
-                                        </p:attrNameLst>
-                                      </p:cBhvr>
-                                      <p:to>
-                                        <p:strVal val="visible"/>
-                                      </p:to>
-                                    </p:set>
-                                    <p:anim calcmode="lin" valueType="num">
-                                      <p:cBhvr additive="base">
-                                        <p:cTn id="17" dur="500" fill="hold"/>
-                                        <p:tgtEl>
-                                          <p:spTgt spid="23"/>
-                                        </p:tgtEl>
-                                        <p:attrNameLst>
-                                          <p:attrName>ppt_x</p:attrName>
-                                        </p:attrNameLst>
-                                      </p:cBhvr>
-                                      <p:tavLst>
-                                        <p:tav tm="0">
-                                          <p:val>
-                                            <p:strVal val="1+#ppt_w/2"/>
-                                          </p:val>
-                                        </p:tav>
-                                        <p:tav tm="100000">
-                                          <p:val>
-                                            <p:strVal val="#ppt_x"/>
-                                          </p:val>
-                                        </p:tav>
-                                      </p:tavLst>
-                                    </p:anim>
-                                    <p:anim calcmode="lin" valueType="num">
-                                      <p:cBhvr additive="base">
-                                        <p:cTn id="18" dur="500" fill="hold"/>
-                                        <p:tgtEl>
-                                          <p:spTgt spid="23"/>
-                                        </p:tgtEl>
-                                        <p:attrNameLst>
-                                          <p:attrName>ppt_y</p:attrName>
-                                        </p:attrNameLst>
-                                      </p:cBhvr>
-                                      <p:tavLst>
-                                        <p:tav tm="0">
-                                          <p:val>
-                                            <p:strVal val="#ppt_y"/>
-                                          </p:val>
-                                        </p:tav>
-                                        <p:tav tm="100000">
-                                          <p:val>
-                                            <p:strVal val="#ppt_y"/>
-                                          </p:val>
-                                        </p:tav>
-                                      </p:tavLst>
-                                    </p:anim>
-                                  </p:childTnLst>
-                                </p:cTn>
-                              </p:par>
-                            </p:childTnLst>
-                          </p:cTn>
-                        </p:par>
-                      </p:childTnLst>
-                    </p:cTn>
-                  </p:par>
-                </p:childTnLst>
-              </p:cTn>
-              <p:prevCondLst>
-                <p:cond evt="onPrev" delay="0">
-                  <p:tgtEl>
-                    <p:sldTgt/>
-                  </p:tgtEl>
-                </p:cond>
-              </p:prevCondLst>
-              <p:nextCondLst>
-                <p:cond evt="onNext" delay="0">
-                  <p:tgtEl>
-                    <p:sldTgt/>
-                  </p:tgtEl>
-                </p:cond>
-              </p:nextCondLst>
-            </p:seq>
-          </p:childTnLst>
-        </p:cTn>
-      </p:par>
-    </p:tnLst>
-  </p:timing>
 </p:sld>
 </file>
 
@@ -24521,6 +25523,879 @@
           <a:chExt cx="0" cy="0"/>
         </a:xfrm>
       </p:grpSpPr>
+      <p:grpSp>
+        <p:nvGrpSpPr>
+          <p:cNvPr id="23" name="组合 22"/>
+          <p:cNvGrpSpPr/>
+          <p:nvPr/>
+        </p:nvGrpSpPr>
+        <p:grpSpPr>
+          <a:xfrm>
+            <a:off x="2904490" y="1944688"/>
+            <a:ext cx="5355590" cy="2170767"/>
+            <a:chOff x="4070982" y="2019402"/>
+            <a:chExt cx="3752293" cy="2170346"/>
+          </a:xfrm>
+        </p:grpSpPr>
+        <p:sp>
+          <p:nvSpPr>
+            <p:cNvPr id="52231" name="文本框 23"/>
+            <p:cNvSpPr txBox="1"/>
+            <p:nvPr/>
+          </p:nvSpPr>
+          <p:spPr>
+            <a:xfrm>
+              <a:off x="4070982" y="2251132"/>
+              <a:ext cx="3752293" cy="1938616"/>
+            </a:xfrm>
+            <a:prstGeom prst="rect">
+              <a:avLst/>
+            </a:prstGeom>
+            <a:noFill/>
+            <a:ln w="9525">
+              <a:noFill/>
+            </a:ln>
+          </p:spPr>
+          <p:txBody>
+            <a:bodyPr wrap="square">
+              <a:spAutoFit/>
+            </a:bodyPr>
+            <a:lstStyle/>
+            <a:p>
+              <a:r>
+                <a:rPr lang="en-US" altLang="zh-CN" sz="4000" dirty="0">
+                  <a:solidFill>
+                    <a:schemeClr val="bg1"/>
+                  </a:solidFill>
+                  <a:latin typeface="Montserrat" panose="00000500000000000000" charset="0"/>
+                  <a:ea typeface="Montserrat" panose="00000500000000000000" charset="0"/>
+                  <a:cs typeface="Montserrat" panose="00000500000000000000" charset="0"/>
+                </a:rPr>
+                <a:t>Future Enhancements</a:t>
+              </a:r>
+              <a:endParaRPr lang="zh-CN" altLang="en-US" sz="4000" dirty="0">
+                <a:solidFill>
+                  <a:schemeClr val="bg1"/>
+                </a:solidFill>
+                <a:latin typeface="Montserrat" panose="00000500000000000000" charset="0"/>
+                <a:ea typeface="Montserrat" panose="00000500000000000000" charset="0"/>
+                <a:cs typeface="Montserrat" panose="00000500000000000000" charset="0"/>
+              </a:endParaRPr>
+            </a:p>
+          </p:txBody>
+        </p:sp>
+        <p:sp>
+          <p:nvSpPr>
+            <p:cNvPr id="52232" name="文本框 35"/>
+            <p:cNvSpPr txBox="1"/>
+            <p:nvPr/>
+          </p:nvSpPr>
+          <p:spPr>
+            <a:xfrm>
+              <a:off x="4118308" y="2019402"/>
+              <a:ext cx="1331264" cy="307777"/>
+            </a:xfrm>
+            <a:prstGeom prst="rect">
+              <a:avLst/>
+            </a:prstGeom>
+            <a:noFill/>
+            <a:ln w="9525">
+              <a:noFill/>
+            </a:ln>
+          </p:spPr>
+          <p:txBody>
+            <a:bodyPr>
+              <a:spAutoFit/>
+            </a:bodyPr>
+            <a:lstStyle/>
+            <a:p>
+              <a:pPr eaLnBrk="1" hangingPunct="1"/>
+              <a:r>
+                <a:rPr lang="en-US" altLang="zh-CN" sz="1400" dirty="0">
+                  <a:solidFill>
+                    <a:schemeClr val="bg1"/>
+                  </a:solidFill>
+                  <a:latin typeface="Montserrat" panose="00000500000000000000" charset="0"/>
+                  <a:ea typeface="Montserrat" panose="00000500000000000000" charset="0"/>
+                  <a:cs typeface="Montserrat" panose="00000500000000000000" charset="0"/>
+                </a:rPr>
+                <a:t>PART FIVE</a:t>
+              </a:r>
+              <a:endParaRPr lang="zh-CN" altLang="en-US" sz="1400" dirty="0">
+                <a:solidFill>
+                  <a:schemeClr val="bg1"/>
+                </a:solidFill>
+                <a:latin typeface="Montserrat" panose="00000500000000000000" charset="0"/>
+                <a:ea typeface="Montserrat" panose="00000500000000000000" charset="0"/>
+                <a:cs typeface="Montserrat" panose="00000500000000000000" charset="0"/>
+              </a:endParaRPr>
+            </a:p>
+          </p:txBody>
+        </p:sp>
+      </p:grpSp>
+      <p:grpSp>
+        <p:nvGrpSpPr>
+          <p:cNvPr id="37" name="组合 36"/>
+          <p:cNvGrpSpPr/>
+          <p:nvPr/>
+        </p:nvGrpSpPr>
+        <p:grpSpPr>
+          <a:xfrm>
+            <a:off x="1552893" y="1944688"/>
+            <a:ext cx="1128712" cy="1128712"/>
+            <a:chOff x="2817516" y="1944350"/>
+            <a:chExt cx="1129689" cy="1129689"/>
+          </a:xfrm>
+        </p:grpSpPr>
+        <p:sp>
+          <p:nvSpPr>
+            <p:cNvPr id="38" name="椭圆 37"/>
+            <p:cNvSpPr/>
+            <p:nvPr/>
+          </p:nvSpPr>
+          <p:spPr>
+            <a:xfrm>
+              <a:off x="2817516" y="1944350"/>
+              <a:ext cx="1129689" cy="1129689"/>
+            </a:xfrm>
+            <a:prstGeom prst="ellipse">
+              <a:avLst/>
+            </a:prstGeom>
+            <a:noFill/>
+            <a:ln>
+              <a:solidFill>
+                <a:schemeClr val="bg1"/>
+              </a:solidFill>
+            </a:ln>
+          </p:spPr>
+          <p:style>
+            <a:lnRef idx="2">
+              <a:schemeClr val="accent1">
+                <a:shade val="50000"/>
+              </a:schemeClr>
+            </a:lnRef>
+            <a:fillRef idx="1">
+              <a:schemeClr val="accent1"/>
+            </a:fillRef>
+            <a:effectRef idx="0">
+              <a:schemeClr val="accent1"/>
+            </a:effectRef>
+            <a:fontRef idx="minor">
+              <a:schemeClr val="lt1"/>
+            </a:fontRef>
+          </p:style>
+          <p:txBody>
+            <a:bodyPr anchor="ctr"/>
+            <a:lstStyle/>
+            <a:p>
+              <a:pPr marL="0" marR="0" lvl="0" indent="0" algn="ctr" defTabSz="685800" rtl="0" eaLnBrk="1" fontAlgn="auto" latinLnBrk="0" hangingPunct="1">
+                <a:lnSpc>
+                  <a:spcPct val="100000"/>
+                </a:lnSpc>
+                <a:spcBef>
+                  <a:spcPts val="0"/>
+                </a:spcBef>
+                <a:spcAft>
+                  <a:spcPts val="0"/>
+                </a:spcAft>
+                <a:buClrTx/>
+                <a:buSzTx/>
+                <a:buFontTx/>
+                <a:buNone/>
+                <a:defRPr/>
+              </a:pPr>
+              <a:endParaRPr kumimoji="0" lang="zh-CN" altLang="en-US" sz="1350" b="0" i="0" u="none" strike="noStrike" kern="1200" cap="none" spc="0" normalizeH="0" baseline="0" noProof="0" dirty="0">
+                <a:ln>
+                  <a:noFill/>
+                </a:ln>
+                <a:solidFill>
+                  <a:schemeClr val="bg1"/>
+                </a:solidFill>
+                <a:effectLst/>
+                <a:uLnTx/>
+                <a:uFillTx/>
+                <a:latin typeface="Montserrat" panose="00000500000000000000" charset="0"/>
+                <a:ea typeface="Montserrat" panose="00000500000000000000" charset="0"/>
+                <a:cs typeface="Montserrat" panose="00000500000000000000" charset="0"/>
+              </a:endParaRPr>
+            </a:p>
+          </p:txBody>
+        </p:sp>
+        <p:sp>
+          <p:nvSpPr>
+            <p:cNvPr id="39" name="Freeform 5"/>
+            <p:cNvSpPr>
+              <a:spLocks noEditPoints="1"/>
+            </p:cNvSpPr>
+            <p:nvPr/>
+          </p:nvSpPr>
+          <p:spPr bwMode="auto">
+            <a:xfrm>
+              <a:off x="3195668" y="2160437"/>
+              <a:ext cx="444885" cy="657794"/>
+            </a:xfrm>
+            <a:custGeom>
+              <a:avLst/>
+              <a:gdLst>
+                <a:gd name="T0" fmla="*/ 189 w 316"/>
+                <a:gd name="T1" fmla="*/ 16 h 467"/>
+                <a:gd name="T2" fmla="*/ 225 w 316"/>
+                <a:gd name="T3" fmla="*/ 7 h 467"/>
+                <a:gd name="T4" fmla="*/ 300 w 316"/>
+                <a:gd name="T5" fmla="*/ 52 h 467"/>
+                <a:gd name="T6" fmla="*/ 309 w 316"/>
+                <a:gd name="T7" fmla="*/ 89 h 467"/>
+                <a:gd name="T8" fmla="*/ 298 w 316"/>
+                <a:gd name="T9" fmla="*/ 105 h 467"/>
+                <a:gd name="T10" fmla="*/ 179 w 316"/>
+                <a:gd name="T11" fmla="*/ 33 h 467"/>
+                <a:gd name="T12" fmla="*/ 189 w 316"/>
+                <a:gd name="T13" fmla="*/ 16 h 467"/>
+                <a:gd name="T14" fmla="*/ 164 w 316"/>
+                <a:gd name="T15" fmla="*/ 58 h 467"/>
+                <a:gd name="T16" fmla="*/ 147 w 316"/>
+                <a:gd name="T17" fmla="*/ 85 h 467"/>
+                <a:gd name="T18" fmla="*/ 266 w 316"/>
+                <a:gd name="T19" fmla="*/ 157 h 467"/>
+                <a:gd name="T20" fmla="*/ 283 w 316"/>
+                <a:gd name="T21" fmla="*/ 130 h 467"/>
+                <a:gd name="T22" fmla="*/ 164 w 316"/>
+                <a:gd name="T23" fmla="*/ 58 h 467"/>
+                <a:gd name="T24" fmla="*/ 2 w 316"/>
+                <a:gd name="T25" fmla="*/ 446 h 467"/>
+                <a:gd name="T26" fmla="*/ 13 w 316"/>
+                <a:gd name="T27" fmla="*/ 354 h 467"/>
+                <a:gd name="T28" fmla="*/ 90 w 316"/>
+                <a:gd name="T29" fmla="*/ 401 h 467"/>
+                <a:gd name="T30" fmla="*/ 13 w 316"/>
+                <a:gd name="T31" fmla="*/ 453 h 467"/>
+                <a:gd name="T32" fmla="*/ 2 w 316"/>
+                <a:gd name="T33" fmla="*/ 446 h 467"/>
+                <a:gd name="T34" fmla="*/ 20 w 316"/>
+                <a:gd name="T35" fmla="*/ 296 h 467"/>
+                <a:gd name="T36" fmla="*/ 133 w 316"/>
+                <a:gd name="T37" fmla="*/ 109 h 467"/>
+                <a:gd name="T38" fmla="*/ 172 w 316"/>
+                <a:gd name="T39" fmla="*/ 133 h 467"/>
+                <a:gd name="T40" fmla="*/ 59 w 316"/>
+                <a:gd name="T41" fmla="*/ 320 h 467"/>
+                <a:gd name="T42" fmla="*/ 20 w 316"/>
+                <a:gd name="T43" fmla="*/ 296 h 467"/>
+                <a:gd name="T44" fmla="*/ 99 w 316"/>
+                <a:gd name="T45" fmla="*/ 344 h 467"/>
+                <a:gd name="T46" fmla="*/ 212 w 316"/>
+                <a:gd name="T47" fmla="*/ 158 h 467"/>
+                <a:gd name="T48" fmla="*/ 252 w 316"/>
+                <a:gd name="T49" fmla="*/ 182 h 467"/>
+                <a:gd name="T50" fmla="*/ 139 w 316"/>
+                <a:gd name="T51" fmla="*/ 368 h 467"/>
+                <a:gd name="T52" fmla="*/ 99 w 316"/>
+                <a:gd name="T53" fmla="*/ 344 h 467"/>
+                <a:gd name="T54" fmla="*/ 95 w 316"/>
+                <a:gd name="T55" fmla="*/ 446 h 467"/>
+                <a:gd name="T56" fmla="*/ 301 w 316"/>
+                <a:gd name="T57" fmla="*/ 446 h 467"/>
+                <a:gd name="T58" fmla="*/ 311 w 316"/>
+                <a:gd name="T59" fmla="*/ 456 h 467"/>
+                <a:gd name="T60" fmla="*/ 301 w 316"/>
+                <a:gd name="T61" fmla="*/ 467 h 467"/>
+                <a:gd name="T62" fmla="*/ 95 w 316"/>
+                <a:gd name="T63" fmla="*/ 467 h 467"/>
+                <a:gd name="T64" fmla="*/ 84 w 316"/>
+                <a:gd name="T65" fmla="*/ 456 h 467"/>
+                <a:gd name="T66" fmla="*/ 95 w 316"/>
+                <a:gd name="T67" fmla="*/ 446 h 467"/>
+              </a:gdLst>
+              <a:ahLst/>
+              <a:cxnLst>
+                <a:cxn ang="0">
+                  <a:pos x="T0" y="T1"/>
+                </a:cxn>
+                <a:cxn ang="0">
+                  <a:pos x="T2" y="T3"/>
+                </a:cxn>
+                <a:cxn ang="0">
+                  <a:pos x="T4" y="T5"/>
+                </a:cxn>
+                <a:cxn ang="0">
+                  <a:pos x="T6" y="T7"/>
+                </a:cxn>
+                <a:cxn ang="0">
+                  <a:pos x="T8" y="T9"/>
+                </a:cxn>
+                <a:cxn ang="0">
+                  <a:pos x="T10" y="T11"/>
+                </a:cxn>
+                <a:cxn ang="0">
+                  <a:pos x="T12" y="T13"/>
+                </a:cxn>
+                <a:cxn ang="0">
+                  <a:pos x="T14" y="T15"/>
+                </a:cxn>
+                <a:cxn ang="0">
+                  <a:pos x="T16" y="T17"/>
+                </a:cxn>
+                <a:cxn ang="0">
+                  <a:pos x="T18" y="T19"/>
+                </a:cxn>
+                <a:cxn ang="0">
+                  <a:pos x="T20" y="T21"/>
+                </a:cxn>
+                <a:cxn ang="0">
+                  <a:pos x="T22" y="T23"/>
+                </a:cxn>
+                <a:cxn ang="0">
+                  <a:pos x="T24" y="T25"/>
+                </a:cxn>
+                <a:cxn ang="0">
+                  <a:pos x="T26" y="T27"/>
+                </a:cxn>
+                <a:cxn ang="0">
+                  <a:pos x="T28" y="T29"/>
+                </a:cxn>
+                <a:cxn ang="0">
+                  <a:pos x="T30" y="T31"/>
+                </a:cxn>
+                <a:cxn ang="0">
+                  <a:pos x="T32" y="T33"/>
+                </a:cxn>
+                <a:cxn ang="0">
+                  <a:pos x="T34" y="T35"/>
+                </a:cxn>
+                <a:cxn ang="0">
+                  <a:pos x="T36" y="T37"/>
+                </a:cxn>
+                <a:cxn ang="0">
+                  <a:pos x="T38" y="T39"/>
+                </a:cxn>
+                <a:cxn ang="0">
+                  <a:pos x="T40" y="T41"/>
+                </a:cxn>
+                <a:cxn ang="0">
+                  <a:pos x="T42" y="T43"/>
+                </a:cxn>
+                <a:cxn ang="0">
+                  <a:pos x="T44" y="T45"/>
+                </a:cxn>
+                <a:cxn ang="0">
+                  <a:pos x="T46" y="T47"/>
+                </a:cxn>
+                <a:cxn ang="0">
+                  <a:pos x="T48" y="T49"/>
+                </a:cxn>
+                <a:cxn ang="0">
+                  <a:pos x="T50" y="T51"/>
+                </a:cxn>
+                <a:cxn ang="0">
+                  <a:pos x="T52" y="T53"/>
+                </a:cxn>
+                <a:cxn ang="0">
+                  <a:pos x="T54" y="T55"/>
+                </a:cxn>
+                <a:cxn ang="0">
+                  <a:pos x="T56" y="T57"/>
+                </a:cxn>
+                <a:cxn ang="0">
+                  <a:pos x="T58" y="T59"/>
+                </a:cxn>
+                <a:cxn ang="0">
+                  <a:pos x="T60" y="T61"/>
+                </a:cxn>
+                <a:cxn ang="0">
+                  <a:pos x="T62" y="T63"/>
+                </a:cxn>
+                <a:cxn ang="0">
+                  <a:pos x="T64" y="T65"/>
+                </a:cxn>
+                <a:cxn ang="0">
+                  <a:pos x="T66" y="T67"/>
+                </a:cxn>
+              </a:cxnLst>
+              <a:rect l="0" t="0" r="r" b="b"/>
+              <a:pathLst>
+                <a:path w="316" h="467">
+                  <a:moveTo>
+                    <a:pt x="189" y="16"/>
+                  </a:moveTo>
+                  <a:cubicBezTo>
+                    <a:pt x="197" y="4"/>
+                    <a:pt x="213" y="0"/>
+                    <a:pt x="225" y="7"/>
+                  </a:cubicBezTo>
+                  <a:cubicBezTo>
+                    <a:pt x="300" y="52"/>
+                    <a:pt x="300" y="52"/>
+                    <a:pt x="300" y="52"/>
+                  </a:cubicBezTo>
+                  <a:cubicBezTo>
+                    <a:pt x="312" y="60"/>
+                    <a:pt x="316" y="76"/>
+                    <a:pt x="309" y="89"/>
+                  </a:cubicBezTo>
+                  <a:cubicBezTo>
+                    <a:pt x="298" y="105"/>
+                    <a:pt x="298" y="105"/>
+                    <a:pt x="298" y="105"/>
+                  </a:cubicBezTo>
+                  <a:cubicBezTo>
+                    <a:pt x="179" y="33"/>
+                    <a:pt x="179" y="33"/>
+                    <a:pt x="179" y="33"/>
+                  </a:cubicBezTo>
+                  <a:lnTo>
+                    <a:pt x="189" y="16"/>
+                  </a:lnTo>
+                  <a:close/>
+                  <a:moveTo>
+                    <a:pt x="164" y="58"/>
+                  </a:moveTo>
+                  <a:cubicBezTo>
+                    <a:pt x="147" y="85"/>
+                    <a:pt x="147" y="85"/>
+                    <a:pt x="147" y="85"/>
+                  </a:cubicBezTo>
+                  <a:cubicBezTo>
+                    <a:pt x="266" y="157"/>
+                    <a:pt x="266" y="157"/>
+                    <a:pt x="266" y="157"/>
+                  </a:cubicBezTo>
+                  <a:cubicBezTo>
+                    <a:pt x="283" y="130"/>
+                    <a:pt x="283" y="130"/>
+                    <a:pt x="283" y="130"/>
+                  </a:cubicBezTo>
+                  <a:lnTo>
+                    <a:pt x="164" y="58"/>
+                  </a:lnTo>
+                  <a:close/>
+                  <a:moveTo>
+                    <a:pt x="2" y="446"/>
+                  </a:moveTo>
+                  <a:cubicBezTo>
+                    <a:pt x="13" y="354"/>
+                    <a:pt x="13" y="354"/>
+                    <a:pt x="13" y="354"/>
+                  </a:cubicBezTo>
+                  <a:cubicBezTo>
+                    <a:pt x="90" y="401"/>
+                    <a:pt x="90" y="401"/>
+                    <a:pt x="90" y="401"/>
+                  </a:cubicBezTo>
+                  <a:cubicBezTo>
+                    <a:pt x="13" y="453"/>
+                    <a:pt x="13" y="453"/>
+                    <a:pt x="13" y="453"/>
+                  </a:cubicBezTo>
+                  <a:cubicBezTo>
+                    <a:pt x="5" y="459"/>
+                    <a:pt x="0" y="456"/>
+                    <a:pt x="2" y="446"/>
+                  </a:cubicBezTo>
+                  <a:close/>
+                  <a:moveTo>
+                    <a:pt x="20" y="296"/>
+                  </a:moveTo>
+                  <a:cubicBezTo>
+                    <a:pt x="133" y="109"/>
+                    <a:pt x="133" y="109"/>
+                    <a:pt x="133" y="109"/>
+                  </a:cubicBezTo>
+                  <a:cubicBezTo>
+                    <a:pt x="172" y="133"/>
+                    <a:pt x="172" y="133"/>
+                    <a:pt x="172" y="133"/>
+                  </a:cubicBezTo>
+                  <a:cubicBezTo>
+                    <a:pt x="59" y="320"/>
+                    <a:pt x="59" y="320"/>
+                    <a:pt x="59" y="320"/>
+                  </a:cubicBezTo>
+                  <a:lnTo>
+                    <a:pt x="20" y="296"/>
+                  </a:lnTo>
+                  <a:close/>
+                  <a:moveTo>
+                    <a:pt x="99" y="344"/>
+                  </a:moveTo>
+                  <a:cubicBezTo>
+                    <a:pt x="212" y="158"/>
+                    <a:pt x="212" y="158"/>
+                    <a:pt x="212" y="158"/>
+                  </a:cubicBezTo>
+                  <a:cubicBezTo>
+                    <a:pt x="252" y="182"/>
+                    <a:pt x="252" y="182"/>
+                    <a:pt x="252" y="182"/>
+                  </a:cubicBezTo>
+                  <a:cubicBezTo>
+                    <a:pt x="139" y="368"/>
+                    <a:pt x="139" y="368"/>
+                    <a:pt x="139" y="368"/>
+                  </a:cubicBezTo>
+                  <a:lnTo>
+                    <a:pt x="99" y="344"/>
+                  </a:lnTo>
+                  <a:close/>
+                  <a:moveTo>
+                    <a:pt x="95" y="446"/>
+                  </a:moveTo>
+                  <a:cubicBezTo>
+                    <a:pt x="301" y="446"/>
+                    <a:pt x="301" y="446"/>
+                    <a:pt x="301" y="446"/>
+                  </a:cubicBezTo>
+                  <a:cubicBezTo>
+                    <a:pt x="307" y="446"/>
+                    <a:pt x="311" y="450"/>
+                    <a:pt x="311" y="456"/>
+                  </a:cubicBezTo>
+                  <a:cubicBezTo>
+                    <a:pt x="311" y="462"/>
+                    <a:pt x="307" y="467"/>
+                    <a:pt x="301" y="467"/>
+                  </a:cubicBezTo>
+                  <a:cubicBezTo>
+                    <a:pt x="95" y="467"/>
+                    <a:pt x="95" y="467"/>
+                    <a:pt x="95" y="467"/>
+                  </a:cubicBezTo>
+                  <a:cubicBezTo>
+                    <a:pt x="89" y="467"/>
+                    <a:pt x="84" y="462"/>
+                    <a:pt x="84" y="456"/>
+                  </a:cubicBezTo>
+                  <a:cubicBezTo>
+                    <a:pt x="84" y="450"/>
+                    <a:pt x="89" y="446"/>
+                    <a:pt x="95" y="446"/>
+                  </a:cubicBezTo>
+                  <a:close/>
+                </a:path>
+              </a:pathLst>
+            </a:custGeom>
+            <a:solidFill>
+              <a:schemeClr val="bg1"/>
+            </a:solidFill>
+            <a:ln>
+              <a:noFill/>
+            </a:ln>
+          </p:spPr>
+          <p:txBody>
+            <a:bodyPr/>
+            <a:lstStyle/>
+            <a:p>
+              <a:pPr marL="0" marR="0" lvl="0" indent="0" algn="l" defTabSz="685800" rtl="0" eaLnBrk="1" fontAlgn="auto" latinLnBrk="0" hangingPunct="1">
+                <a:lnSpc>
+                  <a:spcPct val="100000"/>
+                </a:lnSpc>
+                <a:spcBef>
+                  <a:spcPts val="0"/>
+                </a:spcBef>
+                <a:spcAft>
+                  <a:spcPts val="0"/>
+                </a:spcAft>
+                <a:buClrTx/>
+                <a:buSzTx/>
+                <a:buFontTx/>
+                <a:buNone/>
+                <a:defRPr/>
+              </a:pPr>
+              <a:endParaRPr kumimoji="0" lang="zh-CN" altLang="en-US" sz="1350" b="0" i="0" u="none" strike="noStrike" kern="1200" cap="none" spc="0" normalizeH="0" baseline="0" noProof="0" dirty="0">
+                <a:ln>
+                  <a:noFill/>
+                </a:ln>
+                <a:solidFill>
+                  <a:schemeClr val="bg1"/>
+                </a:solidFill>
+                <a:effectLst/>
+                <a:uLnTx/>
+                <a:uFillTx/>
+                <a:latin typeface="Montserrat" panose="00000500000000000000" charset="0"/>
+                <a:ea typeface="Montserrat" panose="00000500000000000000" charset="0"/>
+                <a:cs typeface="Montserrat" panose="00000500000000000000" charset="0"/>
+              </a:endParaRPr>
+            </a:p>
+          </p:txBody>
+        </p:sp>
+      </p:grpSp>
+    </p:spTree>
+  </p:cSld>
+  <p:clrMapOvr>
+    <a:masterClrMapping/>
+  </p:clrMapOvr>
+  <p:transition spd="slow">
+    <p:fade/>
+  </p:transition>
+  <p:timing>
+    <p:tnLst>
+      <p:par>
+        <p:cTn id="1" dur="indefinite" restart="never" nodeType="tmRoot">
+          <p:childTnLst>
+            <p:seq concurrent="1" nextAc="seek">
+              <p:cTn id="2" dur="indefinite" nodeType="mainSeq">
+                <p:childTnLst>
+                  <p:par>
+                    <p:cTn id="3" fill="hold">
+                      <p:stCondLst>
+                        <p:cond delay="indefinite"/>
+                        <p:cond evt="onBegin" delay="0">
+                          <p:tn val="2"/>
+                        </p:cond>
+                      </p:stCondLst>
+                      <p:childTnLst>
+                        <p:par>
+                          <p:cTn id="4" fill="hold">
+                            <p:stCondLst>
+                              <p:cond delay="0"/>
+                            </p:stCondLst>
+                            <p:childTnLst>
+                              <p:par>
+                                <p:cTn id="5" presetID="53" presetClass="entr" presetSubtype="16" fill="hold" nodeType="afterEffect">
+                                  <p:stCondLst>
+                                    <p:cond delay="0"/>
+                                  </p:stCondLst>
+                                  <p:childTnLst>
+                                    <p:set>
+                                      <p:cBhvr>
+                                        <p:cTn id="6" dur="1" fill="hold">
+                                          <p:stCondLst>
+                                            <p:cond delay="0"/>
+                                          </p:stCondLst>
+                                        </p:cTn>
+                                        <p:tgtEl>
+                                          <p:spTgt spid="37"/>
+                                        </p:tgtEl>
+                                        <p:attrNameLst>
+                                          <p:attrName>style.visibility</p:attrName>
+                                        </p:attrNameLst>
+                                      </p:cBhvr>
+                                      <p:to>
+                                        <p:strVal val="visible"/>
+                                      </p:to>
+                                    </p:set>
+                                    <p:anim calcmode="lin" valueType="num">
+                                      <p:cBhvr>
+                                        <p:cTn id="7" dur="250" fill="hold"/>
+                                        <p:tgtEl>
+                                          <p:spTgt spid="37"/>
+                                        </p:tgtEl>
+                                        <p:attrNameLst>
+                                          <p:attrName>ppt_w</p:attrName>
+                                        </p:attrNameLst>
+                                      </p:cBhvr>
+                                      <p:tavLst>
+                                        <p:tav tm="0">
+                                          <p:val>
+                                            <p:fltVal val="0"/>
+                                          </p:val>
+                                        </p:tav>
+                                        <p:tav tm="100000">
+                                          <p:val>
+                                            <p:strVal val="#ppt_w"/>
+                                          </p:val>
+                                        </p:tav>
+                                      </p:tavLst>
+                                    </p:anim>
+                                    <p:anim calcmode="lin" valueType="num">
+                                      <p:cBhvr>
+                                        <p:cTn id="8" dur="250" fill="hold"/>
+                                        <p:tgtEl>
+                                          <p:spTgt spid="37"/>
+                                        </p:tgtEl>
+                                        <p:attrNameLst>
+                                          <p:attrName>ppt_h</p:attrName>
+                                        </p:attrNameLst>
+                                      </p:cBhvr>
+                                      <p:tavLst>
+                                        <p:tav tm="0">
+                                          <p:val>
+                                            <p:fltVal val="0"/>
+                                          </p:val>
+                                        </p:tav>
+                                        <p:tav tm="100000">
+                                          <p:val>
+                                            <p:strVal val="#ppt_h"/>
+                                          </p:val>
+                                        </p:tav>
+                                      </p:tavLst>
+                                    </p:anim>
+                                    <p:animEffect transition="in" filter="fade">
+                                      <p:cBhvr>
+                                        <p:cTn id="9" dur="250"/>
+                                        <p:tgtEl>
+                                          <p:spTgt spid="37"/>
+                                        </p:tgtEl>
+                                      </p:cBhvr>
+                                    </p:animEffect>
+                                  </p:childTnLst>
+                                </p:cTn>
+                              </p:par>
+                              <p:par>
+                                <p:cTn id="10" presetID="6" presetClass="emph" presetSubtype="0" decel="100000" fill="hold" nodeType="withEffect">
+                                  <p:stCondLst>
+                                    <p:cond delay="200"/>
+                                  </p:stCondLst>
+                                  <p:childTnLst>
+                                    <p:animScale>
+                                      <p:cBhvr>
+                                        <p:cTn id="11" dur="250" fill="hold"/>
+                                        <p:tgtEl>
+                                          <p:spTgt spid="37"/>
+                                        </p:tgtEl>
+                                      </p:cBhvr>
+                                      <p:by x="110000" y="110000"/>
+                                    </p:animScale>
+                                  </p:childTnLst>
+                                </p:cTn>
+                              </p:par>
+                              <p:par>
+                                <p:cTn id="12" presetID="6" presetClass="emph" presetSubtype="0" decel="100000" fill="hold" nodeType="withEffect">
+                                  <p:stCondLst>
+                                    <p:cond delay="400"/>
+                                  </p:stCondLst>
+                                  <p:childTnLst>
+                                    <p:animScale>
+                                      <p:cBhvr>
+                                        <p:cTn id="13" dur="250" fill="hold"/>
+                                        <p:tgtEl>
+                                          <p:spTgt spid="37"/>
+                                        </p:tgtEl>
+                                      </p:cBhvr>
+                                      <p:by x="91000" y="91000"/>
+                                    </p:animScale>
+                                  </p:childTnLst>
+                                </p:cTn>
+                              </p:par>
+                            </p:childTnLst>
+                          </p:cTn>
+                        </p:par>
+                        <p:par>
+                          <p:cTn id="14" fill="hold">
+                            <p:stCondLst>
+                              <p:cond delay="650"/>
+                            </p:stCondLst>
+                            <p:childTnLst>
+                              <p:par>
+                                <p:cTn id="15" presetID="2" presetClass="entr" presetSubtype="2" decel="100000" fill="hold" nodeType="afterEffect">
+                                  <p:stCondLst>
+                                    <p:cond delay="0"/>
+                                  </p:stCondLst>
+                                  <p:childTnLst>
+                                    <p:set>
+                                      <p:cBhvr>
+                                        <p:cTn id="16" dur="1" fill="hold">
+                                          <p:stCondLst>
+                                            <p:cond delay="0"/>
+                                          </p:stCondLst>
+                                        </p:cTn>
+                                        <p:tgtEl>
+                                          <p:spTgt spid="23"/>
+                                        </p:tgtEl>
+                                        <p:attrNameLst>
+                                          <p:attrName>style.visibility</p:attrName>
+                                        </p:attrNameLst>
+                                      </p:cBhvr>
+                                      <p:to>
+                                        <p:strVal val="visible"/>
+                                      </p:to>
+                                    </p:set>
+                                    <p:anim calcmode="lin" valueType="num">
+                                      <p:cBhvr additive="base">
+                                        <p:cTn id="17" dur="500" fill="hold"/>
+                                        <p:tgtEl>
+                                          <p:spTgt spid="23"/>
+                                        </p:tgtEl>
+                                        <p:attrNameLst>
+                                          <p:attrName>ppt_x</p:attrName>
+                                        </p:attrNameLst>
+                                      </p:cBhvr>
+                                      <p:tavLst>
+                                        <p:tav tm="0">
+                                          <p:val>
+                                            <p:strVal val="1+#ppt_w/2"/>
+                                          </p:val>
+                                        </p:tav>
+                                        <p:tav tm="100000">
+                                          <p:val>
+                                            <p:strVal val="#ppt_x"/>
+                                          </p:val>
+                                        </p:tav>
+                                      </p:tavLst>
+                                    </p:anim>
+                                    <p:anim calcmode="lin" valueType="num">
+                                      <p:cBhvr additive="base">
+                                        <p:cTn id="18" dur="500" fill="hold"/>
+                                        <p:tgtEl>
+                                          <p:spTgt spid="23"/>
+                                        </p:tgtEl>
+                                        <p:attrNameLst>
+                                          <p:attrName>ppt_y</p:attrName>
+                                        </p:attrNameLst>
+                                      </p:cBhvr>
+                                      <p:tavLst>
+                                        <p:tav tm="0">
+                                          <p:val>
+                                            <p:strVal val="#ppt_y"/>
+                                          </p:val>
+                                        </p:tav>
+                                        <p:tav tm="100000">
+                                          <p:val>
+                                            <p:strVal val="#ppt_y"/>
+                                          </p:val>
+                                        </p:tav>
+                                      </p:tavLst>
+                                    </p:anim>
+                                  </p:childTnLst>
+                                </p:cTn>
+                              </p:par>
+                            </p:childTnLst>
+                          </p:cTn>
+                        </p:par>
+                      </p:childTnLst>
+                    </p:cTn>
+                  </p:par>
+                </p:childTnLst>
+              </p:cTn>
+              <p:prevCondLst>
+                <p:cond evt="onPrev" delay="0">
+                  <p:tgtEl>
+                    <p:sldTgt/>
+                  </p:tgtEl>
+                </p:cond>
+              </p:prevCondLst>
+              <p:nextCondLst>
+                <p:cond evt="onNext" delay="0">
+                  <p:tgtEl>
+                    <p:sldTgt/>
+                  </p:tgtEl>
+                </p:cond>
+              </p:nextCondLst>
+            </p:seq>
+          </p:childTnLst>
+        </p:cTn>
+      </p:par>
+    </p:tnLst>
+  </p:timing>
+</p:sld>
+</file>
+
+<file path=ppt/slides/slide21.xml><?xml version="1.0" encoding="utf-8"?>
+<p:sld xmlns:a="http://schemas.openxmlformats.org/drawingml/2006/main" xmlns:r="http://schemas.openxmlformats.org/officeDocument/2006/relationships" xmlns:p="http://schemas.openxmlformats.org/presentationml/2006/main">
+  <p:cSld>
+    <p:spTree>
+      <p:nvGrpSpPr>
+        <p:cNvPr id="1" name=""/>
+        <p:cNvGrpSpPr/>
+        <p:nvPr/>
+      </p:nvGrpSpPr>
+      <p:grpSpPr>
+        <a:xfrm>
+          <a:off x="0" y="0"/>
+          <a:ext cx="0" cy="0"/>
+          <a:chOff x="0" y="0"/>
+          <a:chExt cx="0" cy="0"/>
+        </a:xfrm>
+      </p:grpSpPr>
     </p:spTree>
     <p:extLst>
       <p:ext uri="{BB962C8B-B14F-4D97-AF65-F5344CB8AC3E}">
@@ -24534,7 +26409,7 @@
 </p:sld>
 </file>
 
-<file path=ppt/slides/slide21.xml><?xml version="1.0" encoding="utf-8"?>
+<file path=ppt/slides/slide22.xml><?xml version="1.0" encoding="utf-8"?>
 <p:sld xmlns:a="http://schemas.openxmlformats.org/drawingml/2006/main" xmlns:r="http://schemas.openxmlformats.org/officeDocument/2006/relationships" xmlns:p="http://schemas.openxmlformats.org/presentationml/2006/main">
   <p:cSld>
     <p:spTree>
@@ -30574,21 +32449,6 @@
 </file>
 
 <file path=customXml/item1.xml><?xml version="1.0" encoding="utf-8"?>
-<?mso-contentType ?>
-<FormTemplates xmlns="http://schemas.microsoft.com/sharepoint/v3/contenttype/forms">
-  <Display>DocumentLibraryForm</Display>
-  <Edit>DocumentLibraryForm</Edit>
-  <New>DocumentLibraryForm</New>
-</FormTemplates>
-</file>
-
-<file path=customXml/item2.xml><?xml version="1.0" encoding="utf-8"?>
-<p:properties xmlns:p="http://schemas.microsoft.com/office/2006/metadata/properties" xmlns:xsi="http://www.w3.org/2001/XMLSchema-instance" xmlns:pc="http://schemas.microsoft.com/office/infopath/2007/PartnerControls">
-  <documentManagement/>
-</p:properties>
-</file>
-
-<file path=customXml/item3.xml><?xml version="1.0" encoding="utf-8"?>
 <ct:contentTypeSchema xmlns:ct="http://schemas.microsoft.com/office/2006/metadata/contentType" xmlns:ma="http://schemas.microsoft.com/office/2006/metadata/properties/metaAttributes" ct:_="" ma:_="" ma:contentTypeName="Document" ma:contentTypeID="0x0101002054047C02F9ED41A7A142C23BE4457D" ma:contentTypeVersion="12" ma:contentTypeDescription="Create a new document." ma:contentTypeScope="" ma:versionID="081b02a08a3dd6f9da86249bf88ff0fa">
   <xsd:schema xmlns:xsd="http://www.w3.org/2001/XMLSchema" xmlns:xs="http://www.w3.org/2001/XMLSchema" xmlns:p="http://schemas.microsoft.com/office/2006/metadata/properties" xmlns:ns3="9e5dfb77-1fed-4ba7-bad7-e40baf353e9e" xmlns:ns4="910bbf2c-97b4-4994-b01c-38cff218508f" targetNamespace="http://schemas.microsoft.com/office/2006/metadata/properties" ma:root="true" ma:fieldsID="8a341989139c88451bb385f1e9930b6e" ns3:_="" ns4:_="">
     <xsd:import namespace="9e5dfb77-1fed-4ba7-bad7-e40baf353e9e"/>
@@ -30805,10 +32665,36 @@
 </ct:contentTypeSchema>
 </file>
 
+<file path=customXml/item2.xml><?xml version="1.0" encoding="utf-8"?>
+<p:properties xmlns:p="http://schemas.microsoft.com/office/2006/metadata/properties" xmlns:xsi="http://www.w3.org/2001/XMLSchema-instance" xmlns:pc="http://schemas.microsoft.com/office/infopath/2007/PartnerControls">
+  <documentManagement/>
+</p:properties>
+</file>
+
+<file path=customXml/item3.xml><?xml version="1.0" encoding="utf-8"?>
+<?mso-contentType ?>
+<FormTemplates xmlns="http://schemas.microsoft.com/sharepoint/v3/contenttype/forms">
+  <Display>DocumentLibraryForm</Display>
+  <Edit>DocumentLibraryForm</Edit>
+  <New>DocumentLibraryForm</New>
+</FormTemplates>
+</file>
+
 <file path=customXml/itemProps1.xml><?xml version="1.0" encoding="utf-8"?>
-<ds:datastoreItem xmlns:ds="http://schemas.openxmlformats.org/officeDocument/2006/customXml" ds:itemID="{31818201-E71C-469F-B942-EABCBEEB73FD}">
+<ds:datastoreItem xmlns:ds="http://schemas.openxmlformats.org/officeDocument/2006/customXml" ds:itemID="{2028227D-AAF3-4E42-AF96-BCA460ADCBBD}">
   <ds:schemaRefs>
-    <ds:schemaRef ds:uri="http://schemas.microsoft.com/sharepoint/v3/contenttype/forms"/>
+    <ds:schemaRef ds:uri="http://schemas.microsoft.com/office/2006/metadata/contentType"/>
+    <ds:schemaRef ds:uri="http://schemas.microsoft.com/office/2006/metadata/properties/metaAttributes"/>
+    <ds:schemaRef ds:uri="http://www.w3.org/2001/XMLSchema"/>
+    <ds:schemaRef ds:uri="http://schemas.microsoft.com/office/2006/metadata/properties"/>
+    <ds:schemaRef ds:uri="9e5dfb77-1fed-4ba7-bad7-e40baf353e9e"/>
+    <ds:schemaRef ds:uri="910bbf2c-97b4-4994-b01c-38cff218508f"/>
+    <ds:schemaRef ds:uri="http://schemas.microsoft.com/office/2006/documentManagement/types"/>
+    <ds:schemaRef ds:uri="http://schemas.microsoft.com/office/infopath/2007/PartnerControls"/>
+    <ds:schemaRef ds:uri="http://schemas.openxmlformats.org/package/2006/metadata/core-properties"/>
+    <ds:schemaRef ds:uri="http://purl.org/dc/elements/1.1/"/>
+    <ds:schemaRef ds:uri="http://purl.org/dc/terms/"/>
+    <ds:schemaRef ds:uri="http://schemas.microsoft.com/internal/obd"/>
   </ds:schemaRefs>
 </ds:datastoreItem>
 </file>
@@ -30831,20 +32717,9 @@
 </file>
 
 <file path=customXml/itemProps3.xml><?xml version="1.0" encoding="utf-8"?>
-<ds:datastoreItem xmlns:ds="http://schemas.openxmlformats.org/officeDocument/2006/customXml" ds:itemID="{2028227D-AAF3-4E42-AF96-BCA460ADCBBD}">
+<ds:datastoreItem xmlns:ds="http://schemas.openxmlformats.org/officeDocument/2006/customXml" ds:itemID="{31818201-E71C-469F-B942-EABCBEEB73FD}">
   <ds:schemaRefs>
-    <ds:schemaRef ds:uri="http://schemas.microsoft.com/office/2006/metadata/contentType"/>
-    <ds:schemaRef ds:uri="http://schemas.microsoft.com/office/2006/metadata/properties/metaAttributes"/>
-    <ds:schemaRef ds:uri="http://www.w3.org/2001/XMLSchema"/>
-    <ds:schemaRef ds:uri="http://schemas.microsoft.com/office/2006/metadata/properties"/>
-    <ds:schemaRef ds:uri="9e5dfb77-1fed-4ba7-bad7-e40baf353e9e"/>
-    <ds:schemaRef ds:uri="910bbf2c-97b4-4994-b01c-38cff218508f"/>
-    <ds:schemaRef ds:uri="http://schemas.microsoft.com/office/2006/documentManagement/types"/>
-    <ds:schemaRef ds:uri="http://schemas.microsoft.com/office/infopath/2007/PartnerControls"/>
-    <ds:schemaRef ds:uri="http://schemas.openxmlformats.org/package/2006/metadata/core-properties"/>
-    <ds:schemaRef ds:uri="http://purl.org/dc/elements/1.1/"/>
-    <ds:schemaRef ds:uri="http://purl.org/dc/terms/"/>
-    <ds:schemaRef ds:uri="http://schemas.microsoft.com/internal/obd"/>
+    <ds:schemaRef ds:uri="http://schemas.microsoft.com/sharepoint/v3/contenttype/forms"/>
   </ds:schemaRefs>
 </ds:datastoreItem>
 </file>
</xml_diff>